<commit_message>
added ppt to xaringan conversion slideshow
</commit_message>
<xml_diff>
--- a/data/slide guides_C.pptx
+++ b/data/slide guides_C.pptx
@@ -5,13 +5,14 @@
     <p:sldMasterId id="2147483660" r:id="rId1"/>
   </p:sldMasterIdLst>
   <p:notesMasterIdLst>
-    <p:notesMasterId r:id="rId6"/>
+    <p:notesMasterId r:id="rId7"/>
   </p:notesMasterIdLst>
   <p:sldIdLst>
     <p:sldId id="258" r:id="rId2"/>
     <p:sldId id="256" r:id="rId3"/>
     <p:sldId id="257" r:id="rId4"/>
     <p:sldId id="259" r:id="rId5"/>
+    <p:sldId id="260" r:id="rId6"/>
   </p:sldIdLst>
   <p:sldSz cx="24382413" cy="13716000"/>
   <p:notesSz cx="6858000" cy="9144000"/>
@@ -119,12 +120,13 @@
             <p14:sldId id="256"/>
             <p14:sldId id="257"/>
             <p14:sldId id="259"/>
+            <p14:sldId id="260"/>
           </p14:sldIdLst>
         </p14:section>
       </p14:sectionLst>
     </p:ext>
     <p:ext uri="{EFAFB233-063F-42B5-8137-9DF3F51BA10A}">
-      <p15:sldGuideLst xmlns:p15="http://schemas.microsoft.com/office/powerpoint/2012/main">
+      <p15:sldGuideLst xmlns:p15="http://schemas.microsoft.com/office/powerpoint/2012/main" xmlns="">
         <p15:guide id="2" pos="5706" userDrawn="1">
           <p15:clr>
             <a:srgbClr val="A4A3A4"/>
@@ -190,7 +192,7 @@
             </a:lvl1pPr>
           </a:lstStyle>
           <a:p>
-            <a:endParaRPr kumimoji="1" lang="ko-Kore-KR" altLang="en-US"/>
+            <a:endParaRPr kumimoji="1" lang="x-none" altLang="en-US"/>
           </a:p>
         </p:txBody>
       </p:sp>
@@ -222,10 +224,10 @@
           </a:lstStyle>
           <a:p>
             <a:fld id="{82031CEF-AFEB-1A4E-A28F-FBFF94BC0FE1}" type="datetimeFigureOut">
-              <a:rPr kumimoji="1" lang="ko-Kore-KR" altLang="en-US" smtClean="0"/>
-              <a:t>2020. 9. 15.</a:t>
+              <a:rPr kumimoji="1" lang="x-none" altLang="en-US" smtClean="0"/>
+              <a:t>2020-09-23</a:t>
             </a:fld>
-            <a:endParaRPr kumimoji="1" lang="ko-Kore-KR" altLang="en-US"/>
+            <a:endParaRPr kumimoji="1" lang="x-none" altLang="en-US"/>
           </a:p>
         </p:txBody>
       </p:sp>
@@ -258,7 +260,7 @@
           <a:bodyPr vert="horz" lIns="91440" tIns="45720" rIns="91440" bIns="45720" rtlCol="0" anchor="ctr"/>
           <a:lstStyle/>
           <a:p>
-            <a:endParaRPr lang="ko-Kore-KR" altLang="en-US"/>
+            <a:endParaRPr lang="x-none" altLang="en-US"/>
           </a:p>
         </p:txBody>
       </p:sp>
@@ -318,7 +320,7 @@
               <a:rPr kumimoji="1" lang="ko-KR" altLang="en-US"/>
               <a:t>다섯 번째 수준</a:t>
             </a:r>
-            <a:endParaRPr kumimoji="1" lang="ko-Kore-KR" altLang="en-US"/>
+            <a:endParaRPr kumimoji="1" lang="x-none" altLang="en-US"/>
           </a:p>
         </p:txBody>
       </p:sp>
@@ -349,7 +351,7 @@
             </a:lvl1pPr>
           </a:lstStyle>
           <a:p>
-            <a:endParaRPr kumimoji="1" lang="ko-Kore-KR" altLang="en-US"/>
+            <a:endParaRPr kumimoji="1" lang="x-none" altLang="en-US"/>
           </a:p>
         </p:txBody>
       </p:sp>
@@ -381,10 +383,10 @@
           </a:lstStyle>
           <a:p>
             <a:fld id="{6220B126-7DC8-9B4D-BBB9-2E6943E9CE6C}" type="slidenum">
-              <a:rPr kumimoji="1" lang="ko-Kore-KR" altLang="en-US" smtClean="0"/>
+              <a:rPr kumimoji="1" lang="x-none" altLang="en-US" smtClean="0"/>
               <a:t>‹#›</a:t>
             </a:fld>
-            <a:endParaRPr kumimoji="1" lang="ko-Kore-KR" altLang="en-US"/>
+            <a:endParaRPr kumimoji="1" lang="x-none" altLang="en-US"/>
           </a:p>
         </p:txBody>
       </p:sp>
@@ -535,7 +537,7 @@
           <a:bodyPr/>
           <a:lstStyle/>
           <a:p>
-            <a:endParaRPr kumimoji="1" lang="ko-Kore-KR" altLang="en-US" dirty="0"/>
+            <a:endParaRPr kumimoji="1" lang="x-none" altLang="en-US" dirty="0"/>
           </a:p>
         </p:txBody>
       </p:sp>
@@ -555,10 +557,10 @@
           <a:lstStyle/>
           <a:p>
             <a:fld id="{6220B126-7DC8-9B4D-BBB9-2E6943E9CE6C}" type="slidenum">
-              <a:rPr kumimoji="1" lang="ko-Kore-KR" altLang="en-US" smtClean="0"/>
+              <a:rPr kumimoji="1" lang="x-none" altLang="en-US" smtClean="0"/>
               <a:t>1</a:t>
             </a:fld>
-            <a:endParaRPr kumimoji="1" lang="ko-Kore-KR" altLang="en-US"/>
+            <a:endParaRPr kumimoji="1" lang="x-none" altLang="en-US"/>
           </a:p>
         </p:txBody>
       </p:sp>
@@ -705,10 +707,10 @@
           <a:lstStyle/>
           <a:p>
             <a:fld id="{9FB9614D-C823-B348-8996-13B6F253B676}" type="datetimeFigureOut">
-              <a:rPr kumimoji="1" lang="ko-Kore-KR" altLang="en-US" smtClean="0"/>
-              <a:t>2020. 9. 15.</a:t>
+              <a:rPr kumimoji="1" lang="x-none" altLang="en-US" smtClean="0"/>
+              <a:t>2020-09-23</a:t>
             </a:fld>
-            <a:endParaRPr kumimoji="1" lang="ko-Kore-KR" altLang="en-US"/>
+            <a:endParaRPr kumimoji="1" lang="x-none" altLang="en-US"/>
           </a:p>
         </p:txBody>
       </p:sp>
@@ -727,7 +729,7 @@
           <a:bodyPr/>
           <a:lstStyle/>
           <a:p>
-            <a:endParaRPr kumimoji="1" lang="ko-Kore-KR" altLang="en-US"/>
+            <a:endParaRPr kumimoji="1" lang="x-none" altLang="en-US"/>
           </a:p>
         </p:txBody>
       </p:sp>
@@ -747,10 +749,10 @@
           <a:lstStyle/>
           <a:p>
             <a:fld id="{F60DD575-DA1C-5542-92E8-FFBAEB621BDC}" type="slidenum">
-              <a:rPr kumimoji="1" lang="ko-Kore-KR" altLang="en-US" smtClean="0"/>
+              <a:rPr kumimoji="1" lang="x-none" altLang="en-US" smtClean="0"/>
               <a:t>‹#›</a:t>
             </a:fld>
-            <a:endParaRPr kumimoji="1" lang="ko-Kore-KR" altLang="en-US"/>
+            <a:endParaRPr kumimoji="1" lang="x-none" altLang="en-US"/>
           </a:p>
         </p:txBody>
       </p:sp>
@@ -875,10 +877,10 @@
           <a:lstStyle/>
           <a:p>
             <a:fld id="{9FB9614D-C823-B348-8996-13B6F253B676}" type="datetimeFigureOut">
-              <a:rPr kumimoji="1" lang="ko-Kore-KR" altLang="en-US" smtClean="0"/>
-              <a:t>2020. 9. 15.</a:t>
+              <a:rPr kumimoji="1" lang="x-none" altLang="en-US" smtClean="0"/>
+              <a:t>2020-09-23</a:t>
             </a:fld>
-            <a:endParaRPr kumimoji="1" lang="ko-Kore-KR" altLang="en-US"/>
+            <a:endParaRPr kumimoji="1" lang="x-none" altLang="en-US"/>
           </a:p>
         </p:txBody>
       </p:sp>
@@ -897,7 +899,7 @@
           <a:bodyPr/>
           <a:lstStyle/>
           <a:p>
-            <a:endParaRPr kumimoji="1" lang="ko-Kore-KR" altLang="en-US"/>
+            <a:endParaRPr kumimoji="1" lang="x-none" altLang="en-US"/>
           </a:p>
         </p:txBody>
       </p:sp>
@@ -917,10 +919,10 @@
           <a:lstStyle/>
           <a:p>
             <a:fld id="{F60DD575-DA1C-5542-92E8-FFBAEB621BDC}" type="slidenum">
-              <a:rPr kumimoji="1" lang="ko-Kore-KR" altLang="en-US" smtClean="0"/>
+              <a:rPr kumimoji="1" lang="x-none" altLang="en-US" smtClean="0"/>
               <a:t>‹#›</a:t>
             </a:fld>
-            <a:endParaRPr kumimoji="1" lang="ko-Kore-KR" altLang="en-US"/>
+            <a:endParaRPr kumimoji="1" lang="x-none" altLang="en-US"/>
           </a:p>
         </p:txBody>
       </p:sp>
@@ -1055,10 +1057,10 @@
           <a:lstStyle/>
           <a:p>
             <a:fld id="{9FB9614D-C823-B348-8996-13B6F253B676}" type="datetimeFigureOut">
-              <a:rPr kumimoji="1" lang="ko-Kore-KR" altLang="en-US" smtClean="0"/>
-              <a:t>2020. 9. 15.</a:t>
+              <a:rPr kumimoji="1" lang="x-none" altLang="en-US" smtClean="0"/>
+              <a:t>2020-09-23</a:t>
             </a:fld>
-            <a:endParaRPr kumimoji="1" lang="ko-Kore-KR" altLang="en-US"/>
+            <a:endParaRPr kumimoji="1" lang="x-none" altLang="en-US"/>
           </a:p>
         </p:txBody>
       </p:sp>
@@ -1077,7 +1079,7 @@
           <a:bodyPr/>
           <a:lstStyle/>
           <a:p>
-            <a:endParaRPr kumimoji="1" lang="ko-Kore-KR" altLang="en-US"/>
+            <a:endParaRPr kumimoji="1" lang="x-none" altLang="en-US"/>
           </a:p>
         </p:txBody>
       </p:sp>
@@ -1097,10 +1099,10 @@
           <a:lstStyle/>
           <a:p>
             <a:fld id="{F60DD575-DA1C-5542-92E8-FFBAEB621BDC}" type="slidenum">
-              <a:rPr kumimoji="1" lang="ko-Kore-KR" altLang="en-US" smtClean="0"/>
+              <a:rPr kumimoji="1" lang="x-none" altLang="en-US" smtClean="0"/>
               <a:t>‹#›</a:t>
             </a:fld>
-            <a:endParaRPr kumimoji="1" lang="ko-Kore-KR" altLang="en-US"/>
+            <a:endParaRPr kumimoji="1" lang="x-none" altLang="en-US"/>
           </a:p>
         </p:txBody>
       </p:sp>
@@ -1225,10 +1227,10 @@
           <a:lstStyle/>
           <a:p>
             <a:fld id="{9FB9614D-C823-B348-8996-13B6F253B676}" type="datetimeFigureOut">
-              <a:rPr kumimoji="1" lang="ko-Kore-KR" altLang="en-US" smtClean="0"/>
-              <a:t>2020. 9. 15.</a:t>
+              <a:rPr kumimoji="1" lang="x-none" altLang="en-US" smtClean="0"/>
+              <a:t>2020-09-23</a:t>
             </a:fld>
-            <a:endParaRPr kumimoji="1" lang="ko-Kore-KR" altLang="en-US"/>
+            <a:endParaRPr kumimoji="1" lang="x-none" altLang="en-US"/>
           </a:p>
         </p:txBody>
       </p:sp>
@@ -1247,7 +1249,7 @@
           <a:bodyPr/>
           <a:lstStyle/>
           <a:p>
-            <a:endParaRPr kumimoji="1" lang="ko-Kore-KR" altLang="en-US"/>
+            <a:endParaRPr kumimoji="1" lang="x-none" altLang="en-US"/>
           </a:p>
         </p:txBody>
       </p:sp>
@@ -1267,10 +1269,10 @@
           <a:lstStyle/>
           <a:p>
             <a:fld id="{F60DD575-DA1C-5542-92E8-FFBAEB621BDC}" type="slidenum">
-              <a:rPr kumimoji="1" lang="ko-Kore-KR" altLang="en-US" smtClean="0"/>
+              <a:rPr kumimoji="1" lang="x-none" altLang="en-US" smtClean="0"/>
               <a:t>‹#›</a:t>
             </a:fld>
-            <a:endParaRPr kumimoji="1" lang="ko-Kore-KR" altLang="en-US"/>
+            <a:endParaRPr kumimoji="1" lang="x-none" altLang="en-US"/>
           </a:p>
         </p:txBody>
       </p:sp>
@@ -1471,10 +1473,10 @@
           <a:lstStyle/>
           <a:p>
             <a:fld id="{9FB9614D-C823-B348-8996-13B6F253B676}" type="datetimeFigureOut">
-              <a:rPr kumimoji="1" lang="ko-Kore-KR" altLang="en-US" smtClean="0"/>
-              <a:t>2020. 9. 15.</a:t>
+              <a:rPr kumimoji="1" lang="x-none" altLang="en-US" smtClean="0"/>
+              <a:t>2020-09-23</a:t>
             </a:fld>
-            <a:endParaRPr kumimoji="1" lang="ko-Kore-KR" altLang="en-US"/>
+            <a:endParaRPr kumimoji="1" lang="x-none" altLang="en-US"/>
           </a:p>
         </p:txBody>
       </p:sp>
@@ -1493,7 +1495,7 @@
           <a:bodyPr/>
           <a:lstStyle/>
           <a:p>
-            <a:endParaRPr kumimoji="1" lang="ko-Kore-KR" altLang="en-US"/>
+            <a:endParaRPr kumimoji="1" lang="x-none" altLang="en-US"/>
           </a:p>
         </p:txBody>
       </p:sp>
@@ -1513,10 +1515,10 @@
           <a:lstStyle/>
           <a:p>
             <a:fld id="{F60DD575-DA1C-5542-92E8-FFBAEB621BDC}" type="slidenum">
-              <a:rPr kumimoji="1" lang="ko-Kore-KR" altLang="en-US" smtClean="0"/>
+              <a:rPr kumimoji="1" lang="x-none" altLang="en-US" smtClean="0"/>
               <a:t>‹#›</a:t>
             </a:fld>
-            <a:endParaRPr kumimoji="1" lang="ko-Kore-KR" altLang="en-US"/>
+            <a:endParaRPr kumimoji="1" lang="x-none" altLang="en-US"/>
           </a:p>
         </p:txBody>
       </p:sp>
@@ -1703,10 +1705,10 @@
           <a:lstStyle/>
           <a:p>
             <a:fld id="{9FB9614D-C823-B348-8996-13B6F253B676}" type="datetimeFigureOut">
-              <a:rPr kumimoji="1" lang="ko-Kore-KR" altLang="en-US" smtClean="0"/>
-              <a:t>2020. 9. 15.</a:t>
+              <a:rPr kumimoji="1" lang="x-none" altLang="en-US" smtClean="0"/>
+              <a:t>2020-09-23</a:t>
             </a:fld>
-            <a:endParaRPr kumimoji="1" lang="ko-Kore-KR" altLang="en-US"/>
+            <a:endParaRPr kumimoji="1" lang="x-none" altLang="en-US"/>
           </a:p>
         </p:txBody>
       </p:sp>
@@ -1725,7 +1727,7 @@
           <a:bodyPr/>
           <a:lstStyle/>
           <a:p>
-            <a:endParaRPr kumimoji="1" lang="ko-Kore-KR" altLang="en-US"/>
+            <a:endParaRPr kumimoji="1" lang="x-none" altLang="en-US"/>
           </a:p>
         </p:txBody>
       </p:sp>
@@ -1745,10 +1747,10 @@
           <a:lstStyle/>
           <a:p>
             <a:fld id="{F60DD575-DA1C-5542-92E8-FFBAEB621BDC}" type="slidenum">
-              <a:rPr kumimoji="1" lang="ko-Kore-KR" altLang="en-US" smtClean="0"/>
+              <a:rPr kumimoji="1" lang="x-none" altLang="en-US" smtClean="0"/>
               <a:t>‹#›</a:t>
             </a:fld>
-            <a:endParaRPr kumimoji="1" lang="ko-Kore-KR" altLang="en-US"/>
+            <a:endParaRPr kumimoji="1" lang="x-none" altLang="en-US"/>
           </a:p>
         </p:txBody>
       </p:sp>
@@ -2070,10 +2072,10 @@
           <a:lstStyle/>
           <a:p>
             <a:fld id="{9FB9614D-C823-B348-8996-13B6F253B676}" type="datetimeFigureOut">
-              <a:rPr kumimoji="1" lang="ko-Kore-KR" altLang="en-US" smtClean="0"/>
-              <a:t>2020. 9. 15.</a:t>
+              <a:rPr kumimoji="1" lang="x-none" altLang="en-US" smtClean="0"/>
+              <a:t>2020-09-23</a:t>
             </a:fld>
-            <a:endParaRPr kumimoji="1" lang="ko-Kore-KR" altLang="en-US"/>
+            <a:endParaRPr kumimoji="1" lang="x-none" altLang="en-US"/>
           </a:p>
         </p:txBody>
       </p:sp>
@@ -2092,7 +2094,7 @@
           <a:bodyPr/>
           <a:lstStyle/>
           <a:p>
-            <a:endParaRPr kumimoji="1" lang="ko-Kore-KR" altLang="en-US"/>
+            <a:endParaRPr kumimoji="1" lang="x-none" altLang="en-US"/>
           </a:p>
         </p:txBody>
       </p:sp>
@@ -2112,10 +2114,10 @@
           <a:lstStyle/>
           <a:p>
             <a:fld id="{F60DD575-DA1C-5542-92E8-FFBAEB621BDC}" type="slidenum">
-              <a:rPr kumimoji="1" lang="ko-Kore-KR" altLang="en-US" smtClean="0"/>
+              <a:rPr kumimoji="1" lang="x-none" altLang="en-US" smtClean="0"/>
               <a:t>‹#›</a:t>
             </a:fld>
-            <a:endParaRPr kumimoji="1" lang="ko-Kore-KR" altLang="en-US"/>
+            <a:endParaRPr kumimoji="1" lang="x-none" altLang="en-US"/>
           </a:p>
         </p:txBody>
       </p:sp>
@@ -2188,10 +2190,10 @@
           <a:lstStyle/>
           <a:p>
             <a:fld id="{9FB9614D-C823-B348-8996-13B6F253B676}" type="datetimeFigureOut">
-              <a:rPr kumimoji="1" lang="ko-Kore-KR" altLang="en-US" smtClean="0"/>
-              <a:t>2020. 9. 15.</a:t>
+              <a:rPr kumimoji="1" lang="x-none" altLang="en-US" smtClean="0"/>
+              <a:t>2020-09-23</a:t>
             </a:fld>
-            <a:endParaRPr kumimoji="1" lang="ko-Kore-KR" altLang="en-US"/>
+            <a:endParaRPr kumimoji="1" lang="x-none" altLang="en-US"/>
           </a:p>
         </p:txBody>
       </p:sp>
@@ -2210,7 +2212,7 @@
           <a:bodyPr/>
           <a:lstStyle/>
           <a:p>
-            <a:endParaRPr kumimoji="1" lang="ko-Kore-KR" altLang="en-US"/>
+            <a:endParaRPr kumimoji="1" lang="x-none" altLang="en-US"/>
           </a:p>
         </p:txBody>
       </p:sp>
@@ -2230,10 +2232,10 @@
           <a:lstStyle/>
           <a:p>
             <a:fld id="{F60DD575-DA1C-5542-92E8-FFBAEB621BDC}" type="slidenum">
-              <a:rPr kumimoji="1" lang="ko-Kore-KR" altLang="en-US" smtClean="0"/>
+              <a:rPr kumimoji="1" lang="x-none" altLang="en-US" smtClean="0"/>
               <a:t>‹#›</a:t>
             </a:fld>
-            <a:endParaRPr kumimoji="1" lang="ko-Kore-KR" altLang="en-US"/>
+            <a:endParaRPr kumimoji="1" lang="x-none" altLang="en-US"/>
           </a:p>
         </p:txBody>
       </p:sp>
@@ -2283,10 +2285,10 @@
           <a:lstStyle/>
           <a:p>
             <a:fld id="{9FB9614D-C823-B348-8996-13B6F253B676}" type="datetimeFigureOut">
-              <a:rPr kumimoji="1" lang="ko-Kore-KR" altLang="en-US" smtClean="0"/>
-              <a:t>2020. 9. 15.</a:t>
+              <a:rPr kumimoji="1" lang="x-none" altLang="en-US" smtClean="0"/>
+              <a:t>2020-09-23</a:t>
             </a:fld>
-            <a:endParaRPr kumimoji="1" lang="ko-Kore-KR" altLang="en-US"/>
+            <a:endParaRPr kumimoji="1" lang="x-none" altLang="en-US"/>
           </a:p>
         </p:txBody>
       </p:sp>
@@ -2305,7 +2307,7 @@
           <a:bodyPr/>
           <a:lstStyle/>
           <a:p>
-            <a:endParaRPr kumimoji="1" lang="ko-Kore-KR" altLang="en-US"/>
+            <a:endParaRPr kumimoji="1" lang="x-none" altLang="en-US"/>
           </a:p>
         </p:txBody>
       </p:sp>
@@ -2325,10 +2327,10 @@
           <a:lstStyle/>
           <a:p>
             <a:fld id="{F60DD575-DA1C-5542-92E8-FFBAEB621BDC}" type="slidenum">
-              <a:rPr kumimoji="1" lang="ko-Kore-KR" altLang="en-US" smtClean="0"/>
+              <a:rPr kumimoji="1" lang="x-none" altLang="en-US" smtClean="0"/>
               <a:t>‹#›</a:t>
             </a:fld>
-            <a:endParaRPr kumimoji="1" lang="ko-Kore-KR" altLang="en-US"/>
+            <a:endParaRPr kumimoji="1" lang="x-none" altLang="en-US"/>
           </a:p>
         </p:txBody>
       </p:sp>
@@ -2560,10 +2562,10 @@
           <a:lstStyle/>
           <a:p>
             <a:fld id="{9FB9614D-C823-B348-8996-13B6F253B676}" type="datetimeFigureOut">
-              <a:rPr kumimoji="1" lang="ko-Kore-KR" altLang="en-US" smtClean="0"/>
-              <a:t>2020. 9. 15.</a:t>
+              <a:rPr kumimoji="1" lang="x-none" altLang="en-US" smtClean="0"/>
+              <a:t>2020-09-23</a:t>
             </a:fld>
-            <a:endParaRPr kumimoji="1" lang="ko-Kore-KR" altLang="en-US"/>
+            <a:endParaRPr kumimoji="1" lang="x-none" altLang="en-US"/>
           </a:p>
         </p:txBody>
       </p:sp>
@@ -2582,7 +2584,7 @@
           <a:bodyPr/>
           <a:lstStyle/>
           <a:p>
-            <a:endParaRPr kumimoji="1" lang="ko-Kore-KR" altLang="en-US"/>
+            <a:endParaRPr kumimoji="1" lang="x-none" altLang="en-US"/>
           </a:p>
         </p:txBody>
       </p:sp>
@@ -2602,10 +2604,10 @@
           <a:lstStyle/>
           <a:p>
             <a:fld id="{F60DD575-DA1C-5542-92E8-FFBAEB621BDC}" type="slidenum">
-              <a:rPr kumimoji="1" lang="ko-Kore-KR" altLang="en-US" smtClean="0"/>
+              <a:rPr kumimoji="1" lang="x-none" altLang="en-US" smtClean="0"/>
               <a:t>‹#›</a:t>
             </a:fld>
-            <a:endParaRPr kumimoji="1" lang="ko-Kore-KR" altLang="en-US"/>
+            <a:endParaRPr kumimoji="1" lang="x-none" altLang="en-US"/>
           </a:p>
         </p:txBody>
       </p:sp>
@@ -2817,10 +2819,10 @@
           <a:lstStyle/>
           <a:p>
             <a:fld id="{9FB9614D-C823-B348-8996-13B6F253B676}" type="datetimeFigureOut">
-              <a:rPr kumimoji="1" lang="ko-Kore-KR" altLang="en-US" smtClean="0"/>
-              <a:t>2020. 9. 15.</a:t>
+              <a:rPr kumimoji="1" lang="x-none" altLang="en-US" smtClean="0"/>
+              <a:t>2020-09-23</a:t>
             </a:fld>
-            <a:endParaRPr kumimoji="1" lang="ko-Kore-KR" altLang="en-US"/>
+            <a:endParaRPr kumimoji="1" lang="x-none" altLang="en-US"/>
           </a:p>
         </p:txBody>
       </p:sp>
@@ -2839,7 +2841,7 @@
           <a:bodyPr/>
           <a:lstStyle/>
           <a:p>
-            <a:endParaRPr kumimoji="1" lang="ko-Kore-KR" altLang="en-US"/>
+            <a:endParaRPr kumimoji="1" lang="x-none" altLang="en-US"/>
           </a:p>
         </p:txBody>
       </p:sp>
@@ -2859,10 +2861,10 @@
           <a:lstStyle/>
           <a:p>
             <a:fld id="{F60DD575-DA1C-5542-92E8-FFBAEB621BDC}" type="slidenum">
-              <a:rPr kumimoji="1" lang="ko-Kore-KR" altLang="en-US" smtClean="0"/>
+              <a:rPr kumimoji="1" lang="x-none" altLang="en-US" smtClean="0"/>
               <a:t>‹#›</a:t>
             </a:fld>
-            <a:endParaRPr kumimoji="1" lang="ko-Kore-KR" altLang="en-US"/>
+            <a:endParaRPr kumimoji="1" lang="x-none" altLang="en-US"/>
           </a:p>
         </p:txBody>
       </p:sp>
@@ -3030,10 +3032,10 @@
           </a:lstStyle>
           <a:p>
             <a:fld id="{9FB9614D-C823-B348-8996-13B6F253B676}" type="datetimeFigureOut">
-              <a:rPr kumimoji="1" lang="ko-Kore-KR" altLang="en-US" smtClean="0"/>
-              <a:t>2020. 9. 15.</a:t>
+              <a:rPr kumimoji="1" lang="x-none" altLang="en-US" smtClean="0"/>
+              <a:t>2020-09-23</a:t>
             </a:fld>
-            <a:endParaRPr kumimoji="1" lang="ko-Kore-KR" altLang="en-US"/>
+            <a:endParaRPr kumimoji="1" lang="x-none" altLang="en-US"/>
           </a:p>
         </p:txBody>
       </p:sp>
@@ -3070,7 +3072,7 @@
             </a:lvl1pPr>
           </a:lstStyle>
           <a:p>
-            <a:endParaRPr kumimoji="1" lang="ko-Kore-KR" altLang="en-US"/>
+            <a:endParaRPr kumimoji="1" lang="x-none" altLang="en-US"/>
           </a:p>
         </p:txBody>
       </p:sp>
@@ -3108,10 +3110,10 @@
           </a:lstStyle>
           <a:p>
             <a:fld id="{F60DD575-DA1C-5542-92E8-FFBAEB621BDC}" type="slidenum">
-              <a:rPr kumimoji="1" lang="ko-Kore-KR" altLang="en-US" smtClean="0"/>
+              <a:rPr kumimoji="1" lang="x-none" altLang="en-US" smtClean="0"/>
               <a:t>‹#›</a:t>
             </a:fld>
-            <a:endParaRPr kumimoji="1" lang="ko-Kore-KR" altLang="en-US"/>
+            <a:endParaRPr kumimoji="1" lang="x-none" altLang="en-US"/>
           </a:p>
         </p:txBody>
       </p:sp>
@@ -3441,7 +3443,7 @@
           <p:cNvPr id="20" name="TextBox 19">
             <a:extLst>
               <a:ext uri="{FF2B5EF4-FFF2-40B4-BE49-F238E27FC236}">
-                <a16:creationId xmlns:a16="http://schemas.microsoft.com/office/drawing/2014/main" id="{2E4108CA-1083-7949-ADFB-0189F24B96F7}"/>
+                <a16:creationId xmlns:a16="http://schemas.microsoft.com/office/drawing/2014/main" xmlns="" id="{2E4108CA-1083-7949-ADFB-0189F24B96F7}"/>
               </a:ext>
             </a:extLst>
           </p:cNvPr>
@@ -3529,7 +3531,7 @@
               </a:rPr>
               <a:t> 슬라이드 가이드</a:t>
             </a:r>
-            <a:endParaRPr kumimoji="1" lang="ko-Kore-KR" altLang="en-US" sz="4000" b="1" kern="1500" spc="-150" dirty="0">
+            <a:endParaRPr kumimoji="1" lang="x-none" altLang="en-US" sz="4000" b="1" kern="1500" spc="-150" dirty="0">
               <a:solidFill>
                 <a:srgbClr val="FF0000"/>
               </a:solidFill>
@@ -3544,7 +3546,7 @@
           <p:cNvPr id="6" name="TextBox 5">
             <a:extLst>
               <a:ext uri="{FF2B5EF4-FFF2-40B4-BE49-F238E27FC236}">
-                <a16:creationId xmlns:a16="http://schemas.microsoft.com/office/drawing/2014/main" id="{4B7A58E2-4706-4B4D-8E73-A4C8AA279E03}"/>
+                <a16:creationId xmlns:a16="http://schemas.microsoft.com/office/drawing/2014/main" xmlns="" id="{4B7A58E2-4706-4B4D-8E73-A4C8AA279E03}"/>
               </a:ext>
             </a:extLst>
           </p:cNvPr>
@@ -3587,6 +3589,16 @@
               </a:rPr>
               <a:t>사용 폰트 </a:t>
             </a:r>
+            <a:r>
+              <a:rPr kumimoji="1" lang="en-US" altLang="ko-KR" sz="3500" kern="1500" spc="-150" dirty="0">
+                <a:solidFill>
+                  <a:srgbClr val="FF0000"/>
+                </a:solidFill>
+                <a:latin typeface="Noto Sans CJK KR Light" panose="020B0300000000000000" pitchFamily="34" charset="-128"/>
+                <a:ea typeface="Noto Sans CJK KR Light" panose="020B0300000000000000" pitchFamily="34" charset="-128"/>
+              </a:rPr>
+              <a:t/>
+            </a:r>
             <a:br>
               <a:rPr kumimoji="1" lang="en-US" altLang="ko-KR" sz="3500" kern="1500" spc="-150" dirty="0">
                 <a:solidFill>
@@ -3666,7 +3678,7 @@
               </a:rPr>
             </a:br>
             <a:r>
-              <a:rPr lang="en-US" altLang="ko-Kore-KR" sz="3500" dirty="0">
+              <a:rPr lang="en-US" altLang="x-none" sz="3500" dirty="0">
                 <a:solidFill>
                   <a:srgbClr val="FF0000"/>
                 </a:solidFill>
@@ -3675,15 +3687,25 @@
                 <a:hlinkClick r:id="rId3">
                   <a:extLst>
                     <a:ext uri="{A12FA001-AC4F-418D-AE19-62706E023703}">
-                      <ahyp:hlinkClr xmlns:ahyp="http://schemas.microsoft.com/office/drawing/2018/hyperlinkcolor" val="tx"/>
+                      <ahyp:hlinkClr xmlns:ahyp="http://schemas.microsoft.com/office/drawing/2018/hyperlinkcolor" xmlns="" val="tx"/>
                     </a:ext>
                   </a:extLst>
                 </a:hlinkClick>
               </a:rPr>
               <a:t>https://www.google.com/get/noto/#sans-kore</a:t>
             </a:r>
+            <a:r>
+              <a:rPr lang="en-US" altLang="x-none" sz="3500" dirty="0">
+                <a:solidFill>
+                  <a:srgbClr val="FF0000"/>
+                </a:solidFill>
+                <a:latin typeface="Noto Sans CJK KR Light" panose="020B0300000000000000" pitchFamily="34" charset="-128"/>
+                <a:ea typeface="Noto Sans CJK KR Light" panose="020B0300000000000000" pitchFamily="34" charset="-128"/>
+              </a:rPr>
+              <a:t/>
+            </a:r>
             <a:br>
-              <a:rPr lang="en-US" altLang="ko-Kore-KR" sz="3500" dirty="0">
+              <a:rPr lang="en-US" altLang="x-none" sz="3500" dirty="0">
                 <a:solidFill>
                   <a:srgbClr val="FF0000"/>
                 </a:solidFill>
@@ -3789,6 +3811,16 @@
               </a:rPr>
               <a:t>포맷</a:t>
             </a:r>
+            <a:r>
+              <a:rPr kumimoji="1" lang="en-US" altLang="ko-KR" sz="3500" kern="1500" spc="-150" dirty="0">
+                <a:solidFill>
+                  <a:srgbClr val="FF0000"/>
+                </a:solidFill>
+                <a:latin typeface="Noto Sans CJK KR Light" panose="020B0300000000000000" pitchFamily="34" charset="-128"/>
+                <a:ea typeface="Noto Sans CJK KR Light" panose="020B0300000000000000" pitchFamily="34" charset="-128"/>
+              </a:rPr>
+              <a:t/>
+            </a:r>
             <a:br>
               <a:rPr kumimoji="1" lang="en-US" altLang="ko-KR" sz="3500" kern="1500" spc="-150" dirty="0">
                 <a:solidFill>
@@ -3985,6 +4017,16 @@
                 <a:ea typeface="Noto Sans CJK KR Light" panose="020B0300000000000000" pitchFamily="34" charset="-128"/>
               </a:rPr>
               <a:t> </a:t>
+            </a:r>
+            <a:r>
+              <a:rPr kumimoji="1" lang="en-US" altLang="ko-KR" sz="3500" kern="1500" spc="-150" dirty="0">
+                <a:solidFill>
+                  <a:srgbClr val="FF0000"/>
+                </a:solidFill>
+                <a:latin typeface="Noto Sans CJK KR Light" panose="020B0300000000000000" pitchFamily="34" charset="-128"/>
+                <a:ea typeface="Noto Sans CJK KR Light" panose="020B0300000000000000" pitchFamily="34" charset="-128"/>
+              </a:rPr>
+              <a:t/>
             </a:r>
             <a:br>
               <a:rPr kumimoji="1" lang="en-US" altLang="ko-KR" sz="3500" kern="1500" spc="-150" dirty="0">
@@ -4057,7 +4099,7 @@
               <a:buFont typeface="Arial" panose="020B0604020202020204" pitchFamily="34" charset="0"/>
               <a:buChar char="•"/>
             </a:pPr>
-            <a:endParaRPr kumimoji="1" lang="en-US" altLang="ko-Kore-KR" sz="3500" kern="1500" spc="-150" dirty="0">
+            <a:endParaRPr kumimoji="1" lang="en-US" altLang="x-none" sz="3500" kern="1500" spc="-150" dirty="0">
               <a:solidFill>
                 <a:srgbClr val="FF0000"/>
               </a:solidFill>
@@ -4116,8 +4158,15 @@
               </a:rPr>
               <a:t>datayanolja.master@gmail.com</a:t>
             </a:r>
+            <a:r>
+              <a:rPr lang="en-US" altLang="x-none" sz="3500" dirty="0">
+                <a:latin typeface="Noto Sans CJK KR Light" panose="020B0300000000000000" pitchFamily="34" charset="-128"/>
+                <a:ea typeface="Noto Sans CJK KR Light" panose="020B0300000000000000" pitchFamily="34" charset="-128"/>
+              </a:rPr>
+              <a:t/>
+            </a:r>
             <a:br>
-              <a:rPr lang="en-US" altLang="ko-Kore-KR" sz="3500" dirty="0">
+              <a:rPr lang="en-US" altLang="x-none" sz="3500" dirty="0">
                 <a:latin typeface="Noto Sans CJK KR Light" panose="020B0300000000000000" pitchFamily="34" charset="-128"/>
                 <a:ea typeface="Noto Sans CJK KR Light" panose="020B0300000000000000" pitchFamily="34" charset="-128"/>
               </a:rPr>
@@ -4167,7 +4216,7 @@
           <p:cNvPr id="18" name="그림 17">
             <a:extLst>
               <a:ext uri="{FF2B5EF4-FFF2-40B4-BE49-F238E27FC236}">
-                <a16:creationId xmlns:a16="http://schemas.microsoft.com/office/drawing/2014/main" id="{DFBD9B3E-8621-ED40-9D43-7585BA6E84F0}"/>
+                <a16:creationId xmlns:a16="http://schemas.microsoft.com/office/drawing/2014/main" xmlns="" id="{DFBD9B3E-8621-ED40-9D43-7585BA6E84F0}"/>
               </a:ext>
             </a:extLst>
           </p:cNvPr>
@@ -4197,7 +4246,7 @@
           <p:cNvPr id="9" name="TextBox 8">
             <a:extLst>
               <a:ext uri="{FF2B5EF4-FFF2-40B4-BE49-F238E27FC236}">
-                <a16:creationId xmlns:a16="http://schemas.microsoft.com/office/drawing/2014/main" id="{454B4978-6125-604F-AE03-58DD5D6D78C8}"/>
+                <a16:creationId xmlns:a16="http://schemas.microsoft.com/office/drawing/2014/main" xmlns="" id="{454B4978-6125-604F-AE03-58DD5D6D78C8}"/>
               </a:ext>
             </a:extLst>
           </p:cNvPr>
@@ -4230,8 +4279,8 @@
                 <a:solidFill>
                   <a:schemeClr val="bg1"/>
                 </a:solidFill>
-                <a:latin typeface="Noto Sans CJK KR" panose="020B0500000000000000" pitchFamily="34" charset="-128"/>
-                <a:ea typeface="Noto Sans CJK KR" panose="020B0500000000000000" pitchFamily="34" charset="-128"/>
+                <a:latin typeface="Noto Sans CJK KR Black" pitchFamily="34" charset="-127"/>
+                <a:ea typeface="Noto Sans CJK KR Black" pitchFamily="34" charset="-127"/>
               </a:rPr>
               <a:t>데이터 </a:t>
             </a:r>
@@ -4240,8 +4289,8 @@
                 <a:solidFill>
                   <a:schemeClr val="bg1"/>
                 </a:solidFill>
-                <a:latin typeface="Noto Sans CJK KR" panose="020B0500000000000000" pitchFamily="34" charset="-128"/>
-                <a:ea typeface="Noto Sans CJK KR" panose="020B0500000000000000" pitchFamily="34" charset="-128"/>
+                <a:latin typeface="Noto Sans CJK KR Black" pitchFamily="34" charset="-127"/>
+                <a:ea typeface="Noto Sans CJK KR Black" pitchFamily="34" charset="-127"/>
               </a:rPr>
               <a:t>분석팀과</a:t>
             </a:r>
@@ -4249,8 +4298,8 @@
               <a:solidFill>
                 <a:schemeClr val="bg1"/>
               </a:solidFill>
-              <a:latin typeface="Noto Sans CJK KR" panose="020B0500000000000000" pitchFamily="34" charset="-128"/>
-              <a:ea typeface="Noto Sans CJK KR" panose="020B0500000000000000" pitchFamily="34" charset="-128"/>
+              <a:latin typeface="Noto Sans CJK KR Black" pitchFamily="34" charset="-127"/>
+              <a:ea typeface="Noto Sans CJK KR Black" pitchFamily="34" charset="-127"/>
             </a:endParaRPr>
           </a:p>
           <a:p>
@@ -4264,8 +4313,8 @@
                 <a:solidFill>
                   <a:schemeClr val="bg1"/>
                 </a:solidFill>
-                <a:latin typeface="Noto Sans CJK KR" panose="020B0500000000000000" pitchFamily="34" charset="-128"/>
-                <a:ea typeface="Noto Sans CJK KR" panose="020B0500000000000000" pitchFamily="34" charset="-128"/>
+                <a:latin typeface="Noto Sans CJK KR Black" pitchFamily="34" charset="-127"/>
+                <a:ea typeface="Noto Sans CJK KR Black" pitchFamily="34" charset="-127"/>
               </a:rPr>
               <a:t>이스포츠</a:t>
             </a:r>
@@ -4274,8 +4323,8 @@
                 <a:solidFill>
                   <a:schemeClr val="bg1"/>
                 </a:solidFill>
-                <a:latin typeface="Noto Sans CJK KR" panose="020B0500000000000000" pitchFamily="34" charset="-128"/>
-                <a:ea typeface="Noto Sans CJK KR" panose="020B0500000000000000" pitchFamily="34" charset="-128"/>
+                <a:latin typeface="Noto Sans CJK KR Black" pitchFamily="34" charset="-127"/>
+                <a:ea typeface="Noto Sans CJK KR Black" pitchFamily="34" charset="-127"/>
               </a:rPr>
               <a:t> 선수단의</a:t>
             </a:r>
@@ -4283,8 +4332,8 @@
               <a:solidFill>
                 <a:schemeClr val="bg1"/>
               </a:solidFill>
-              <a:latin typeface="Noto Sans CJK KR" panose="020B0500000000000000" pitchFamily="34" charset="-128"/>
-              <a:ea typeface="Noto Sans CJK KR" panose="020B0500000000000000" pitchFamily="34" charset="-128"/>
+              <a:latin typeface="Noto Sans CJK KR Black" pitchFamily="34" charset="-127"/>
+              <a:ea typeface="Noto Sans CJK KR Black" pitchFamily="34" charset="-127"/>
             </a:endParaRPr>
           </a:p>
           <a:p>
@@ -4298,8 +4347,8 @@
                 <a:solidFill>
                   <a:schemeClr val="bg1"/>
                 </a:solidFill>
-                <a:latin typeface="Noto Sans CJK KR" panose="020B0500000000000000" pitchFamily="34" charset="-128"/>
-                <a:ea typeface="Noto Sans CJK KR" panose="020B0500000000000000" pitchFamily="34" charset="-128"/>
+                <a:latin typeface="Noto Sans CJK KR Black" pitchFamily="34" charset="-127"/>
+                <a:ea typeface="Noto Sans CJK KR Black" pitchFamily="34" charset="-127"/>
               </a:rPr>
               <a:t>신뢰쌓기</a:t>
             </a:r>
@@ -4308,17 +4357,17 @@
                 <a:solidFill>
                   <a:schemeClr val="bg1"/>
                 </a:solidFill>
-                <a:latin typeface="Noto Sans CJK KR" panose="020B0500000000000000" pitchFamily="34" charset="-128"/>
-                <a:ea typeface="Noto Sans CJK KR" panose="020B0500000000000000" pitchFamily="34" charset="-128"/>
+                <a:latin typeface="Noto Sans CJK KR Black" pitchFamily="34" charset="-127"/>
+                <a:ea typeface="Noto Sans CJK KR Black" pitchFamily="34" charset="-127"/>
               </a:rPr>
               <a:t> 프로세스</a:t>
             </a:r>
-            <a:endParaRPr kumimoji="1" lang="ko-Kore-KR" altLang="en-US" sz="12000" b="1" kern="1500" spc="-150" dirty="0">
+            <a:endParaRPr kumimoji="1" lang="x-none" altLang="en-US" sz="12000" b="1" kern="1500" spc="-150" dirty="0">
               <a:solidFill>
                 <a:schemeClr val="bg1"/>
               </a:solidFill>
-              <a:latin typeface="Noto Sans CJK KR" panose="020B0500000000000000" pitchFamily="34" charset="-128"/>
-              <a:ea typeface="Noto Sans CJK KR" panose="020B0500000000000000" pitchFamily="34" charset="-128"/>
+              <a:latin typeface="Noto Sans CJK KR Black" pitchFamily="34" charset="-127"/>
+              <a:ea typeface="Noto Sans CJK KR Black" pitchFamily="34" charset="-127"/>
             </a:endParaRPr>
           </a:p>
         </p:txBody>
@@ -4328,7 +4377,7 @@
           <p:cNvPr id="10" name="TextBox 9">
             <a:extLst>
               <a:ext uri="{FF2B5EF4-FFF2-40B4-BE49-F238E27FC236}">
-                <a16:creationId xmlns:a16="http://schemas.microsoft.com/office/drawing/2014/main" id="{C880A598-24D5-FE43-9658-485B6C4BB8A1}"/>
+                <a16:creationId xmlns:a16="http://schemas.microsoft.com/office/drawing/2014/main" xmlns="" id="{C880A598-24D5-FE43-9658-485B6C4BB8A1}"/>
               </a:ext>
             </a:extLst>
           </p:cNvPr>
@@ -4436,7 +4485,7 @@
               </a:rPr>
               <a:t>)</a:t>
             </a:r>
-            <a:endParaRPr kumimoji="1" lang="ko-Kore-KR" altLang="en-US" sz="6000" kern="1500" spc="-150" dirty="0">
+            <a:endParaRPr kumimoji="1" lang="x-none" altLang="en-US" sz="6000" kern="1500" spc="-150" dirty="0">
               <a:solidFill>
                 <a:schemeClr val="bg1"/>
               </a:solidFill>
@@ -4451,7 +4500,7 @@
           <p:cNvPr id="11" name="TextBox 10">
             <a:extLst>
               <a:ext uri="{FF2B5EF4-FFF2-40B4-BE49-F238E27FC236}">
-                <a16:creationId xmlns:a16="http://schemas.microsoft.com/office/drawing/2014/main" id="{3158CF2A-E25B-D641-99E3-29BD137D418B}"/>
+                <a16:creationId xmlns:a16="http://schemas.microsoft.com/office/drawing/2014/main" xmlns="" id="{3158CF2A-E25B-D641-99E3-29BD137D418B}"/>
               </a:ext>
             </a:extLst>
           </p:cNvPr>
@@ -4511,7 +4560,7 @@
               </a:rPr>
               <a:t> 포맷 고정</a:t>
             </a:r>
-            <a:endParaRPr kumimoji="1" lang="ko-Kore-KR" altLang="en-US" sz="2400" kern="1500" spc="-150" dirty="0">
+            <a:endParaRPr kumimoji="1" lang="x-none" altLang="en-US" sz="2400" kern="1500" spc="-150" dirty="0">
               <a:solidFill>
                 <a:srgbClr val="FF0000"/>
               </a:solidFill>
@@ -4526,7 +4575,7 @@
           <p:cNvPr id="13" name="TextBox 12">
             <a:extLst>
               <a:ext uri="{FF2B5EF4-FFF2-40B4-BE49-F238E27FC236}">
-                <a16:creationId xmlns:a16="http://schemas.microsoft.com/office/drawing/2014/main" id="{EA485A58-BE7A-C941-8630-A6D4EFCF35D0}"/>
+                <a16:creationId xmlns:a16="http://schemas.microsoft.com/office/drawing/2014/main" xmlns="" id="{EA485A58-BE7A-C941-8630-A6D4EFCF35D0}"/>
               </a:ext>
             </a:extLst>
           </p:cNvPr>
@@ -4606,7 +4655,7 @@
               </a:rPr>
               <a:t>줄 이내 </a:t>
             </a:r>
-            <a:endParaRPr kumimoji="1" lang="ko-Kore-KR" altLang="en-US" sz="2400" kern="1500" spc="-150" dirty="0">
+            <a:endParaRPr kumimoji="1" lang="x-none" altLang="en-US" sz="2400" kern="1500" spc="-150" dirty="0">
               <a:solidFill>
                 <a:srgbClr val="FF0000"/>
               </a:solidFill>
@@ -4621,7 +4670,7 @@
           <p:cNvPr id="14" name="TextBox 13">
             <a:extLst>
               <a:ext uri="{FF2B5EF4-FFF2-40B4-BE49-F238E27FC236}">
-                <a16:creationId xmlns:a16="http://schemas.microsoft.com/office/drawing/2014/main" id="{BA66F629-CD84-9C4F-AB8A-B63509855977}"/>
+                <a16:creationId xmlns:a16="http://schemas.microsoft.com/office/drawing/2014/main" xmlns="" id="{BA66F629-CD84-9C4F-AB8A-B63509855977}"/>
               </a:ext>
             </a:extLst>
           </p:cNvPr>
@@ -4761,7 +4810,7 @@
               </a:rPr>
               <a:t> </a:t>
             </a:r>
-            <a:endParaRPr kumimoji="1" lang="ko-Kore-KR" altLang="en-US" sz="2400" kern="1500" spc="-150" dirty="0">
+            <a:endParaRPr kumimoji="1" lang="x-none" altLang="en-US" sz="2400" kern="1500" spc="-150" dirty="0">
               <a:solidFill>
                 <a:srgbClr val="FF0000"/>
               </a:solidFill>
@@ -4776,7 +4825,7 @@
           <p:cNvPr id="19" name="직선 연결선[R] 18">
             <a:extLst>
               <a:ext uri="{FF2B5EF4-FFF2-40B4-BE49-F238E27FC236}">
-                <a16:creationId xmlns:a16="http://schemas.microsoft.com/office/drawing/2014/main" id="{F19AFDA4-04D7-5E48-B89E-694C3C2AD633}"/>
+                <a16:creationId xmlns:a16="http://schemas.microsoft.com/office/drawing/2014/main" xmlns="" id="{F19AFDA4-04D7-5E48-B89E-694C3C2AD633}"/>
               </a:ext>
             </a:extLst>
           </p:cNvPr>
@@ -4847,7 +4896,7 @@
           <p:cNvPr id="4" name="그룹 3">
             <a:extLst>
               <a:ext uri="{FF2B5EF4-FFF2-40B4-BE49-F238E27FC236}">
-                <a16:creationId xmlns:a16="http://schemas.microsoft.com/office/drawing/2014/main" id="{D86BA9AB-A847-644D-9391-D5C3662F66FB}"/>
+                <a16:creationId xmlns:a16="http://schemas.microsoft.com/office/drawing/2014/main" xmlns="" id="{D86BA9AB-A847-644D-9391-D5C3662F66FB}"/>
               </a:ext>
             </a:extLst>
           </p:cNvPr>
@@ -4867,7 +4916,7 @@
             <p:cNvPr id="14" name="직사각형 13">
               <a:extLst>
                 <a:ext uri="{FF2B5EF4-FFF2-40B4-BE49-F238E27FC236}">
-                  <a16:creationId xmlns:a16="http://schemas.microsoft.com/office/drawing/2014/main" id="{5402BEB2-A6D9-1545-86B6-AC830857EF36}"/>
+                  <a16:creationId xmlns:a16="http://schemas.microsoft.com/office/drawing/2014/main" xmlns="" id="{5402BEB2-A6D9-1545-86B6-AC830857EF36}"/>
                 </a:ext>
               </a:extLst>
             </p:cNvPr>
@@ -4912,7 +4961,7 @@
             <a:lstStyle/>
             <a:p>
               <a:pPr algn="ctr"/>
-              <a:endParaRPr kumimoji="1" lang="ko-Kore-KR" altLang="en-US" dirty="0"/>
+              <a:endParaRPr kumimoji="1" lang="x-none" altLang="en-US" dirty="0"/>
             </a:p>
           </p:txBody>
         </p:sp>
@@ -4921,7 +4970,7 @@
             <p:cNvPr id="17" name="그림 16">
               <a:extLst>
                 <a:ext uri="{FF2B5EF4-FFF2-40B4-BE49-F238E27FC236}">
-                  <a16:creationId xmlns:a16="http://schemas.microsoft.com/office/drawing/2014/main" id="{CA69E168-729E-5746-B0FA-E18A3B96C2FA}"/>
+                  <a16:creationId xmlns:a16="http://schemas.microsoft.com/office/drawing/2014/main" xmlns="" id="{CA69E168-729E-5746-B0FA-E18A3B96C2FA}"/>
                 </a:ext>
               </a:extLst>
             </p:cNvPr>
@@ -4953,7 +5002,7 @@
             <p:cNvPr id="18" name="TextBox 17">
               <a:extLst>
                 <a:ext uri="{FF2B5EF4-FFF2-40B4-BE49-F238E27FC236}">
-                  <a16:creationId xmlns:a16="http://schemas.microsoft.com/office/drawing/2014/main" id="{DA311057-BA33-054E-95E7-CB95FDBA8976}"/>
+                  <a16:creationId xmlns:a16="http://schemas.microsoft.com/office/drawing/2014/main" xmlns="" id="{DA311057-BA33-054E-95E7-CB95FDBA8976}"/>
                 </a:ext>
               </a:extLst>
             </p:cNvPr>
@@ -5011,6 +5060,16 @@
                 </a:rPr>
                 <a:t>  </a:t>
               </a:r>
+              <a:r>
+                <a:rPr kumimoji="1" lang="en-US" altLang="ko-KR" sz="2400" b="1" kern="1500" spc="-150" dirty="0">
+                  <a:solidFill>
+                    <a:srgbClr val="FF0000"/>
+                  </a:solidFill>
+                  <a:latin typeface="Source Han Sans K" panose="020B0500000000000000" pitchFamily="34" charset="-128"/>
+                  <a:ea typeface="Source Han Sans K" panose="020B0500000000000000" pitchFamily="34" charset="-128"/>
+                </a:rPr>
+                <a:t/>
+              </a:r>
               <a:br>
                 <a:rPr kumimoji="1" lang="en-US" altLang="ko-KR" sz="2400" b="1" kern="1500" spc="-150" dirty="0">
                   <a:solidFill>
@@ -5056,6 +5115,16 @@
                   <a:ea typeface="Source Han Sans K" panose="020B0500000000000000" pitchFamily="34" charset="-128"/>
                 </a:rPr>
                 <a:t>이 영역에 가려지지 않도록 </a:t>
+              </a:r>
+              <a:r>
+                <a:rPr kumimoji="1" lang="en-US" altLang="ko-KR" sz="2400" kern="1500" spc="-150" dirty="0">
+                  <a:solidFill>
+                    <a:srgbClr val="FF0000"/>
+                  </a:solidFill>
+                  <a:latin typeface="Source Han Sans K" panose="020B0500000000000000" pitchFamily="34" charset="-128"/>
+                  <a:ea typeface="Source Han Sans K" panose="020B0500000000000000" pitchFamily="34" charset="-128"/>
+                </a:rPr>
+                <a:t/>
               </a:r>
               <a:br>
                 <a:rPr kumimoji="1" lang="en-US" altLang="ko-KR" sz="2400" kern="1500" spc="-150" dirty="0">
@@ -5106,7 +5175,7 @@
                 </a:rPr>
                 <a:t>.</a:t>
               </a:r>
-              <a:endParaRPr kumimoji="1" lang="ko-Kore-KR" altLang="en-US" sz="2400" kern="1500" spc="-150" dirty="0">
+              <a:endParaRPr kumimoji="1" lang="x-none" altLang="en-US" sz="2400" kern="1500" spc="-150" dirty="0">
                 <a:solidFill>
                   <a:srgbClr val="FF0000"/>
                 </a:solidFill>
@@ -5122,7 +5191,7 @@
           <p:cNvPr id="15" name="TextBox 14">
             <a:extLst>
               <a:ext uri="{FF2B5EF4-FFF2-40B4-BE49-F238E27FC236}">
-                <a16:creationId xmlns:a16="http://schemas.microsoft.com/office/drawing/2014/main" id="{F2F3FF30-0BEB-FC49-8C4B-F3A57C6DF33E}"/>
+                <a16:creationId xmlns:a16="http://schemas.microsoft.com/office/drawing/2014/main" xmlns="" id="{F2F3FF30-0BEB-FC49-8C4B-F3A57C6DF33E}"/>
               </a:ext>
             </a:extLst>
           </p:cNvPr>
@@ -5216,7 +5285,7 @@
               </a:rPr>
               <a:t> 프로세스</a:t>
             </a:r>
-            <a:endParaRPr kumimoji="1" lang="ko-Kore-KR" altLang="en-US" sz="10000" b="1" kern="1500" spc="-150" dirty="0">
+            <a:endParaRPr kumimoji="1" lang="x-none" altLang="en-US" sz="10000" b="1" kern="1500" spc="-150" dirty="0">
               <a:latin typeface="Noto Sans CJK KR" panose="020B0500000000000000" pitchFamily="34" charset="-128"/>
               <a:ea typeface="Noto Sans CJK KR" panose="020B0500000000000000" pitchFamily="34" charset="-128"/>
             </a:endParaRPr>
@@ -5228,7 +5297,7 @@
           <p:cNvPr id="13" name="TextBox 12">
             <a:extLst>
               <a:ext uri="{FF2B5EF4-FFF2-40B4-BE49-F238E27FC236}">
-                <a16:creationId xmlns:a16="http://schemas.microsoft.com/office/drawing/2014/main" id="{7D6789C3-E17B-5B45-BD08-27A4740F7028}"/>
+                <a16:creationId xmlns:a16="http://schemas.microsoft.com/office/drawing/2014/main" xmlns="" id="{7D6789C3-E17B-5B45-BD08-27A4740F7028}"/>
               </a:ext>
             </a:extLst>
           </p:cNvPr>
@@ -5290,7 +5359,7 @@
               </a:rPr>
               <a:t> 포맷 고정</a:t>
             </a:r>
-            <a:endParaRPr kumimoji="1" lang="ko-Kore-KR" altLang="en-US" sz="2400" kern="1500" spc="-150" dirty="0">
+            <a:endParaRPr kumimoji="1" lang="x-none" altLang="en-US" sz="2400" kern="1500" spc="-150" dirty="0">
               <a:solidFill>
                 <a:srgbClr val="FF0000"/>
               </a:solidFill>
@@ -5305,7 +5374,7 @@
           <p:cNvPr id="16" name="TextBox 15">
             <a:extLst>
               <a:ext uri="{FF2B5EF4-FFF2-40B4-BE49-F238E27FC236}">
-                <a16:creationId xmlns:a16="http://schemas.microsoft.com/office/drawing/2014/main" id="{9EE40D1A-D2C7-754A-AD91-5C503013FF03}"/>
+                <a16:creationId xmlns:a16="http://schemas.microsoft.com/office/drawing/2014/main" xmlns="" id="{9EE40D1A-D2C7-754A-AD91-5C503013FF03}"/>
               </a:ext>
             </a:extLst>
           </p:cNvPr>
@@ -5377,7 +5446,7 @@
               </a:rPr>
               <a:t> </a:t>
             </a:r>
-            <a:endParaRPr kumimoji="1" lang="ko-Kore-KR" altLang="en-US" sz="2400" kern="1500" spc="-150" dirty="0">
+            <a:endParaRPr kumimoji="1" lang="x-none" altLang="en-US" sz="2400" kern="1500" spc="-150" dirty="0">
               <a:solidFill>
                 <a:srgbClr val="FF0000"/>
               </a:solidFill>
@@ -5392,7 +5461,7 @@
           <p:cNvPr id="24" name="TextBox 23">
             <a:extLst>
               <a:ext uri="{FF2B5EF4-FFF2-40B4-BE49-F238E27FC236}">
-                <a16:creationId xmlns:a16="http://schemas.microsoft.com/office/drawing/2014/main" id="{8643A1EB-B2CC-1B4B-885B-10C71A22AD01}"/>
+                <a16:creationId xmlns:a16="http://schemas.microsoft.com/office/drawing/2014/main" xmlns="" id="{8643A1EB-B2CC-1B4B-885B-10C71A22AD01}"/>
               </a:ext>
             </a:extLst>
           </p:cNvPr>
@@ -5504,7 +5573,7 @@
               </a:rPr>
               <a:t>)</a:t>
             </a:r>
-            <a:endParaRPr kumimoji="1" lang="ko-Kore-KR" altLang="en-US" sz="2400" kern="1500" spc="-150" dirty="0">
+            <a:endParaRPr kumimoji="1" lang="x-none" altLang="en-US" sz="2400" kern="1500" spc="-150" dirty="0">
               <a:solidFill>
                 <a:srgbClr val="FF0000"/>
               </a:solidFill>
@@ -5519,7 +5588,7 @@
           <p:cNvPr id="25" name="TextBox 24">
             <a:extLst>
               <a:ext uri="{FF2B5EF4-FFF2-40B4-BE49-F238E27FC236}">
-                <a16:creationId xmlns:a16="http://schemas.microsoft.com/office/drawing/2014/main" id="{07D4BA8D-2650-AC48-A15B-8F756951AB6A}"/>
+                <a16:creationId xmlns:a16="http://schemas.microsoft.com/office/drawing/2014/main" xmlns="" id="{07D4BA8D-2650-AC48-A15B-8F756951AB6A}"/>
               </a:ext>
             </a:extLst>
           </p:cNvPr>
@@ -5611,7 +5680,7 @@
               </a:rPr>
               <a:t>1page</a:t>
             </a:r>
-            <a:endParaRPr kumimoji="1" lang="ko-Kore-KR" altLang="en-US" sz="2400" kern="1500" spc="-150" dirty="0">
+            <a:endParaRPr kumimoji="1" lang="x-none" altLang="en-US" sz="2400" kern="1500" spc="-150" dirty="0">
               <a:solidFill>
                 <a:srgbClr val="FF0000"/>
               </a:solidFill>
@@ -5626,7 +5695,7 @@
           <p:cNvPr id="28" name="그룹 27">
             <a:extLst>
               <a:ext uri="{FF2B5EF4-FFF2-40B4-BE49-F238E27FC236}">
-                <a16:creationId xmlns:a16="http://schemas.microsoft.com/office/drawing/2014/main" id="{14A7B455-9171-1440-8138-FFF18720482C}"/>
+                <a16:creationId xmlns:a16="http://schemas.microsoft.com/office/drawing/2014/main" xmlns="" id="{14A7B455-9171-1440-8138-FFF18720482C}"/>
               </a:ext>
             </a:extLst>
           </p:cNvPr>
@@ -5646,7 +5715,7 @@
             <p:cNvPr id="29" name="TextBox 28">
               <a:extLst>
                 <a:ext uri="{FF2B5EF4-FFF2-40B4-BE49-F238E27FC236}">
-                  <a16:creationId xmlns:a16="http://schemas.microsoft.com/office/drawing/2014/main" id="{073D8BA5-614A-C441-9A52-5FB2314A9777}"/>
+                  <a16:creationId xmlns:a16="http://schemas.microsoft.com/office/drawing/2014/main" xmlns="" id="{073D8BA5-614A-C441-9A52-5FB2314A9777}"/>
                 </a:ext>
               </a:extLst>
             </p:cNvPr>
@@ -5675,7 +5744,7 @@
                 </a:spcAft>
               </a:pPr>
               <a:r>
-                <a:rPr kumimoji="1" lang="en-US" altLang="ko-Kore-KR" sz="3500" kern="1500" spc="-150" dirty="0">
+                <a:rPr kumimoji="1" lang="en-US" altLang="x-none" sz="3500" kern="1500" spc="-150" dirty="0">
                   <a:solidFill>
                     <a:schemeClr val="bg1">
                       <a:lumMod val="50000"/>
@@ -5699,7 +5768,7 @@
                 <a:t>1</a:t>
               </a:r>
               <a:r>
-                <a:rPr kumimoji="1" lang="en-US" altLang="ko-Kore-KR" sz="3500" kern="1500" spc="-150" dirty="0">
+                <a:rPr kumimoji="1" lang="en-US" altLang="x-none" sz="3500" kern="1500" spc="-150" dirty="0">
                   <a:solidFill>
                     <a:schemeClr val="bg1">
                       <a:lumMod val="50000"/>
@@ -5722,7 +5791,7 @@
                 </a:rPr>
                 <a:t>02</a:t>
               </a:r>
-              <a:endParaRPr kumimoji="1" lang="ko-Kore-KR" altLang="en-US" sz="3500" kern="1500" spc="-150" dirty="0">
+              <a:endParaRPr kumimoji="1" lang="x-none" altLang="en-US" sz="3500" kern="1500" spc="-150" dirty="0">
                 <a:solidFill>
                   <a:schemeClr val="bg1">
                     <a:lumMod val="50000"/>
@@ -5739,7 +5808,7 @@
             <p:cNvPr id="30" name="그림 29">
               <a:extLst>
                 <a:ext uri="{FF2B5EF4-FFF2-40B4-BE49-F238E27FC236}">
-                  <a16:creationId xmlns:a16="http://schemas.microsoft.com/office/drawing/2014/main" id="{C4F86EA8-CC7F-C846-B350-FCA8FAA0BEE8}"/>
+                  <a16:creationId xmlns:a16="http://schemas.microsoft.com/office/drawing/2014/main" xmlns="" id="{C4F86EA8-CC7F-C846-B350-FCA8FAA0BEE8}"/>
                 </a:ext>
               </a:extLst>
             </p:cNvPr>
@@ -5769,7 +5838,7 @@
             <p:cNvPr id="31" name="그림 30">
               <a:extLst>
                 <a:ext uri="{FF2B5EF4-FFF2-40B4-BE49-F238E27FC236}">
-                  <a16:creationId xmlns:a16="http://schemas.microsoft.com/office/drawing/2014/main" id="{1846FF54-60EC-7148-BB64-662C8129405B}"/>
+                  <a16:creationId xmlns:a16="http://schemas.microsoft.com/office/drawing/2014/main" xmlns="" id="{1846FF54-60EC-7148-BB64-662C8129405B}"/>
                 </a:ext>
               </a:extLst>
             </p:cNvPr>
@@ -5830,7 +5899,7 @@
           <p:cNvPr id="9" name="TextBox 8">
             <a:extLst>
               <a:ext uri="{FF2B5EF4-FFF2-40B4-BE49-F238E27FC236}">
-                <a16:creationId xmlns:a16="http://schemas.microsoft.com/office/drawing/2014/main" id="{454B4978-6125-604F-AE03-58DD5D6D78C8}"/>
+                <a16:creationId xmlns:a16="http://schemas.microsoft.com/office/drawing/2014/main" xmlns="" id="{454B4978-6125-604F-AE03-58DD5D6D78C8}"/>
               </a:ext>
             </a:extLst>
           </p:cNvPr>
@@ -5865,7 +5934,7 @@
               </a:rPr>
               <a:t>제목</a:t>
             </a:r>
-            <a:endParaRPr kumimoji="1" lang="ko-Kore-KR" altLang="en-US" sz="8000" kern="1500" spc="-150" dirty="0">
+            <a:endParaRPr kumimoji="1" lang="x-none" altLang="en-US" sz="8000" kern="1500" spc="-150" dirty="0">
               <a:latin typeface="Noto Sans CJK KR" panose="020B0500000000000000" pitchFamily="34" charset="-128"/>
               <a:ea typeface="Noto Sans CJK KR" panose="020B0500000000000000" pitchFamily="34" charset="-128"/>
             </a:endParaRPr>
@@ -5877,7 +5946,7 @@
           <p:cNvPr id="10" name="TextBox 9">
             <a:extLst>
               <a:ext uri="{FF2B5EF4-FFF2-40B4-BE49-F238E27FC236}">
-                <a16:creationId xmlns:a16="http://schemas.microsoft.com/office/drawing/2014/main" id="{C880A598-24D5-FE43-9658-485B6C4BB8A1}"/>
+                <a16:creationId xmlns:a16="http://schemas.microsoft.com/office/drawing/2014/main" xmlns="" id="{C880A598-24D5-FE43-9658-485B6C4BB8A1}"/>
               </a:ext>
             </a:extLst>
           </p:cNvPr>
@@ -5977,8 +6046,15 @@
               </a:rPr>
               <a:t> </a:t>
             </a:r>
+            <a:r>
+              <a:rPr lang="x-none" altLang="en-US" sz="7000" spc="-150" dirty="0">
+                <a:latin typeface="Noto Sans CJK KR" panose="020B0500000000000000" pitchFamily="34" charset="-128"/>
+                <a:ea typeface="Noto Sans CJK KR" panose="020B0500000000000000" pitchFamily="34" charset="-128"/>
+              </a:rPr>
+              <a:t/>
+            </a:r>
             <a:br>
-              <a:rPr lang="ko-Kore-KR" altLang="en-US" sz="7000" spc="-150" dirty="0">
+              <a:rPr lang="x-none" altLang="en-US" sz="7000" spc="-150" dirty="0">
                 <a:latin typeface="Noto Sans CJK KR" panose="020B0500000000000000" pitchFamily="34" charset="-128"/>
                 <a:ea typeface="Noto Sans CJK KR" panose="020B0500000000000000" pitchFamily="34" charset="-128"/>
               </a:rPr>
@@ -6017,6 +6093,13 @@
                 <a:ea typeface="Noto Sans CJK KR" panose="020B0500000000000000" pitchFamily="34" charset="-128"/>
               </a:rPr>
               <a:t>와 관련된 </a:t>
+            </a:r>
+            <a:r>
+              <a:rPr lang="en-US" altLang="ko-KR" sz="7000" spc="-150" dirty="0">
+                <a:latin typeface="Noto Sans CJK KR" panose="020B0500000000000000" pitchFamily="34" charset="-128"/>
+                <a:ea typeface="Noto Sans CJK KR" panose="020B0500000000000000" pitchFamily="34" charset="-128"/>
+              </a:rPr>
+              <a:t/>
             </a:r>
             <a:br>
               <a:rPr lang="en-US" altLang="ko-KR" sz="7000" spc="-150" dirty="0">
@@ -6046,7 +6129,7 @@
           <p:cNvPr id="26" name="TextBox 25">
             <a:extLst>
               <a:ext uri="{FF2B5EF4-FFF2-40B4-BE49-F238E27FC236}">
-                <a16:creationId xmlns:a16="http://schemas.microsoft.com/office/drawing/2014/main" id="{069DF03A-E46E-464A-A048-A27BCCEFAE06}"/>
+                <a16:creationId xmlns:a16="http://schemas.microsoft.com/office/drawing/2014/main" xmlns="" id="{069DF03A-E46E-464A-A048-A27BCCEFAE06}"/>
               </a:ext>
             </a:extLst>
           </p:cNvPr>
@@ -6158,7 +6241,7 @@
               </a:rPr>
               <a:t>)</a:t>
             </a:r>
-            <a:endParaRPr kumimoji="1" lang="ko-Kore-KR" altLang="en-US" sz="2400" kern="1500" spc="-150" dirty="0">
+            <a:endParaRPr kumimoji="1" lang="x-none" altLang="en-US" sz="2400" kern="1500" spc="-150" dirty="0">
               <a:solidFill>
                 <a:srgbClr val="FF0000"/>
               </a:solidFill>
@@ -6173,7 +6256,7 @@
           <p:cNvPr id="29" name="TextBox 28">
             <a:extLst>
               <a:ext uri="{FF2B5EF4-FFF2-40B4-BE49-F238E27FC236}">
-                <a16:creationId xmlns:a16="http://schemas.microsoft.com/office/drawing/2014/main" id="{3C69B82F-4F02-9046-A176-0764836BB33B}"/>
+                <a16:creationId xmlns:a16="http://schemas.microsoft.com/office/drawing/2014/main" xmlns="" id="{3C69B82F-4F02-9046-A176-0764836BB33B}"/>
               </a:ext>
             </a:extLst>
           </p:cNvPr>
@@ -6355,7 +6438,7 @@
               </a:rPr>
               <a:t>1.3~1.5</a:t>
             </a:r>
-            <a:endParaRPr kumimoji="1" lang="ko-Kore-KR" altLang="en-US" sz="2400" kern="1500" spc="-150" dirty="0">
+            <a:endParaRPr kumimoji="1" lang="x-none" altLang="en-US" sz="2400" kern="1500" spc="-150" dirty="0">
               <a:solidFill>
                 <a:srgbClr val="FF0000"/>
               </a:solidFill>
@@ -6370,7 +6453,7 @@
           <p:cNvPr id="30" name="TextBox 29">
             <a:extLst>
               <a:ext uri="{FF2B5EF4-FFF2-40B4-BE49-F238E27FC236}">
-                <a16:creationId xmlns:a16="http://schemas.microsoft.com/office/drawing/2014/main" id="{BFA0812D-8D6F-BE45-BFEB-0DD33D74DF0D}"/>
+                <a16:creationId xmlns:a16="http://schemas.microsoft.com/office/drawing/2014/main" xmlns="" id="{BFA0812D-8D6F-BE45-BFEB-0DD33D74DF0D}"/>
               </a:ext>
             </a:extLst>
           </p:cNvPr>
@@ -6502,7 +6585,7 @@
               </a:rPr>
               <a:t>Noto Sans CJK KR(Regular 40pt)</a:t>
             </a:r>
-            <a:endParaRPr kumimoji="1" lang="ko-Kore-KR" altLang="en-US" sz="2400" kern="1500" spc="-150" dirty="0">
+            <a:endParaRPr kumimoji="1" lang="x-none" altLang="en-US" sz="2400" kern="1500" spc="-150" dirty="0">
               <a:solidFill>
                 <a:srgbClr val="FF0000"/>
               </a:solidFill>
@@ -6517,7 +6600,7 @@
           <p:cNvPr id="33" name="TextBox 32">
             <a:extLst>
               <a:ext uri="{FF2B5EF4-FFF2-40B4-BE49-F238E27FC236}">
-                <a16:creationId xmlns:a16="http://schemas.microsoft.com/office/drawing/2014/main" id="{13FA5401-2C4C-DD47-B451-C55B59C663E3}"/>
+                <a16:creationId xmlns:a16="http://schemas.microsoft.com/office/drawing/2014/main" xmlns="" id="{13FA5401-2C4C-DD47-B451-C55B59C663E3}"/>
               </a:ext>
             </a:extLst>
           </p:cNvPr>
@@ -6580,14 +6663,14 @@
               </a:rPr>
             </a:br>
             <a:r>
-              <a:rPr lang="en-US" altLang="ko-Kore-KR" sz="4000" dirty="0">
+              <a:rPr lang="en-US" altLang="x-none" sz="4000" dirty="0">
                 <a:latin typeface="Noto Sans CJK KR" panose="020B0500000000000000" pitchFamily="34" charset="-128"/>
                 <a:ea typeface="Noto Sans CJK KR" panose="020B0500000000000000" pitchFamily="34" charset="-128"/>
                 <a:hlinkClick r:id="rId2"/>
               </a:rPr>
               <a:t>datayanolja.master@gmail.com</a:t>
             </a:r>
-            <a:endParaRPr kumimoji="1" lang="ko-Kore-KR" altLang="en-US" sz="4000" kern="1500" spc="-150" dirty="0">
+            <a:endParaRPr kumimoji="1" lang="x-none" altLang="en-US" sz="4000" kern="1500" spc="-150" dirty="0">
               <a:latin typeface="Noto Sans CJK KR" panose="020B0500000000000000" pitchFamily="34" charset="-128"/>
               <a:ea typeface="Noto Sans CJK KR" panose="020B0500000000000000" pitchFamily="34" charset="-128"/>
             </a:endParaRPr>
@@ -6599,7 +6682,7 @@
           <p:cNvPr id="38" name="그룹 37">
             <a:extLst>
               <a:ext uri="{FF2B5EF4-FFF2-40B4-BE49-F238E27FC236}">
-                <a16:creationId xmlns:a16="http://schemas.microsoft.com/office/drawing/2014/main" id="{13B50072-F1AE-E04E-B6E2-F37A3079EFF4}"/>
+                <a16:creationId xmlns:a16="http://schemas.microsoft.com/office/drawing/2014/main" xmlns="" id="{13B50072-F1AE-E04E-B6E2-F37A3079EFF4}"/>
               </a:ext>
             </a:extLst>
           </p:cNvPr>
@@ -6619,7 +6702,7 @@
             <p:cNvPr id="39" name="직사각형 38">
               <a:extLst>
                 <a:ext uri="{FF2B5EF4-FFF2-40B4-BE49-F238E27FC236}">
-                  <a16:creationId xmlns:a16="http://schemas.microsoft.com/office/drawing/2014/main" id="{3CF64B48-6419-3C41-91A5-07F7885271D2}"/>
+                  <a16:creationId xmlns:a16="http://schemas.microsoft.com/office/drawing/2014/main" xmlns="" id="{3CF64B48-6419-3C41-91A5-07F7885271D2}"/>
                 </a:ext>
               </a:extLst>
             </p:cNvPr>
@@ -6664,7 +6747,7 @@
             <a:lstStyle/>
             <a:p>
               <a:pPr algn="ctr"/>
-              <a:endParaRPr kumimoji="1" lang="ko-Kore-KR" altLang="en-US" dirty="0"/>
+              <a:endParaRPr kumimoji="1" lang="x-none" altLang="en-US" dirty="0"/>
             </a:p>
           </p:txBody>
         </p:sp>
@@ -6673,7 +6756,7 @@
             <p:cNvPr id="40" name="그림 39">
               <a:extLst>
                 <a:ext uri="{FF2B5EF4-FFF2-40B4-BE49-F238E27FC236}">
-                  <a16:creationId xmlns:a16="http://schemas.microsoft.com/office/drawing/2014/main" id="{08A1CBC2-22B4-9A4E-AF6B-BE6695A2A794}"/>
+                  <a16:creationId xmlns:a16="http://schemas.microsoft.com/office/drawing/2014/main" xmlns="" id="{08A1CBC2-22B4-9A4E-AF6B-BE6695A2A794}"/>
                 </a:ext>
               </a:extLst>
             </p:cNvPr>
@@ -6705,7 +6788,7 @@
             <p:cNvPr id="41" name="TextBox 40">
               <a:extLst>
                 <a:ext uri="{FF2B5EF4-FFF2-40B4-BE49-F238E27FC236}">
-                  <a16:creationId xmlns:a16="http://schemas.microsoft.com/office/drawing/2014/main" id="{1510710D-D3DF-494E-9899-BAD109D7C41C}"/>
+                  <a16:creationId xmlns:a16="http://schemas.microsoft.com/office/drawing/2014/main" xmlns="" id="{1510710D-D3DF-494E-9899-BAD109D7C41C}"/>
                 </a:ext>
               </a:extLst>
             </p:cNvPr>
@@ -6763,6 +6846,16 @@
                 </a:rPr>
                 <a:t>  </a:t>
               </a:r>
+              <a:r>
+                <a:rPr kumimoji="1" lang="en-US" altLang="ko-KR" sz="2400" b="1" kern="1500" spc="-150" dirty="0">
+                  <a:solidFill>
+                    <a:srgbClr val="FF0000"/>
+                  </a:solidFill>
+                  <a:latin typeface="Source Han Sans K" panose="020B0500000000000000" pitchFamily="34" charset="-128"/>
+                  <a:ea typeface="Source Han Sans K" panose="020B0500000000000000" pitchFamily="34" charset="-128"/>
+                </a:rPr>
+                <a:t/>
+              </a:r>
               <a:br>
                 <a:rPr kumimoji="1" lang="en-US" altLang="ko-KR" sz="2400" b="1" kern="1500" spc="-150" dirty="0">
                   <a:solidFill>
@@ -6808,6 +6901,16 @@
                   <a:ea typeface="Source Han Sans K" panose="020B0500000000000000" pitchFamily="34" charset="-128"/>
                 </a:rPr>
                 <a:t>이 영역에 가려지지 않도록 </a:t>
+              </a:r>
+              <a:r>
+                <a:rPr kumimoji="1" lang="en-US" altLang="ko-KR" sz="2400" kern="1500" spc="-150" dirty="0">
+                  <a:solidFill>
+                    <a:srgbClr val="FF0000"/>
+                  </a:solidFill>
+                  <a:latin typeface="Source Han Sans K" panose="020B0500000000000000" pitchFamily="34" charset="-128"/>
+                  <a:ea typeface="Source Han Sans K" panose="020B0500000000000000" pitchFamily="34" charset="-128"/>
+                </a:rPr>
+                <a:t/>
               </a:r>
               <a:br>
                 <a:rPr kumimoji="1" lang="en-US" altLang="ko-KR" sz="2400" kern="1500" spc="-150" dirty="0">
@@ -6858,7 +6961,7 @@
                 </a:rPr>
                 <a:t>.</a:t>
               </a:r>
-              <a:endParaRPr kumimoji="1" lang="ko-Kore-KR" altLang="en-US" sz="2400" kern="1500" spc="-150" dirty="0">
+              <a:endParaRPr kumimoji="1" lang="x-none" altLang="en-US" sz="2400" kern="1500" spc="-150" dirty="0">
                 <a:solidFill>
                   <a:srgbClr val="FF0000"/>
                 </a:solidFill>
@@ -6874,7 +6977,7 @@
           <p:cNvPr id="42" name="그룹 41">
             <a:extLst>
               <a:ext uri="{FF2B5EF4-FFF2-40B4-BE49-F238E27FC236}">
-                <a16:creationId xmlns:a16="http://schemas.microsoft.com/office/drawing/2014/main" id="{C0AA966D-52BA-8C46-A21B-8DB812C08D8B}"/>
+                <a16:creationId xmlns:a16="http://schemas.microsoft.com/office/drawing/2014/main" xmlns="" id="{C0AA966D-52BA-8C46-A21B-8DB812C08D8B}"/>
               </a:ext>
             </a:extLst>
           </p:cNvPr>
@@ -6894,7 +6997,7 @@
             <p:cNvPr id="43" name="TextBox 42">
               <a:extLst>
                 <a:ext uri="{FF2B5EF4-FFF2-40B4-BE49-F238E27FC236}">
-                  <a16:creationId xmlns:a16="http://schemas.microsoft.com/office/drawing/2014/main" id="{72044BF3-7086-BF42-8477-95F53A3E08FD}"/>
+                  <a16:creationId xmlns:a16="http://schemas.microsoft.com/office/drawing/2014/main" xmlns="" id="{72044BF3-7086-BF42-8477-95F53A3E08FD}"/>
                 </a:ext>
               </a:extLst>
             </p:cNvPr>
@@ -6923,7 +7026,7 @@
                 </a:spcAft>
               </a:pPr>
               <a:r>
-                <a:rPr kumimoji="1" lang="en-US" altLang="ko-Kore-KR" sz="3500" kern="1500" spc="-150" dirty="0">
+                <a:rPr kumimoji="1" lang="en-US" altLang="x-none" sz="3500" kern="1500" spc="-150" dirty="0">
                   <a:solidFill>
                     <a:schemeClr val="bg1">
                       <a:lumMod val="50000"/>
@@ -6946,7 +7049,7 @@
                 </a:rPr>
                 <a:t>02</a:t>
               </a:r>
-              <a:endParaRPr kumimoji="1" lang="ko-Kore-KR" altLang="en-US" sz="3500" kern="1500" spc="-150" dirty="0">
+              <a:endParaRPr kumimoji="1" lang="x-none" altLang="en-US" sz="3500" kern="1500" spc="-150" dirty="0">
                 <a:solidFill>
                   <a:schemeClr val="bg1">
                     <a:lumMod val="50000"/>
@@ -6963,7 +7066,7 @@
             <p:cNvPr id="44" name="그림 43">
               <a:extLst>
                 <a:ext uri="{FF2B5EF4-FFF2-40B4-BE49-F238E27FC236}">
-                  <a16:creationId xmlns:a16="http://schemas.microsoft.com/office/drawing/2014/main" id="{B6021665-9C07-FB4E-B9DE-F0E9F9512CB5}"/>
+                  <a16:creationId xmlns:a16="http://schemas.microsoft.com/office/drawing/2014/main" xmlns="" id="{B6021665-9C07-FB4E-B9DE-F0E9F9512CB5}"/>
                 </a:ext>
               </a:extLst>
             </p:cNvPr>
@@ -6993,7 +7096,7 @@
             <p:cNvPr id="45" name="그림 44">
               <a:extLst>
                 <a:ext uri="{FF2B5EF4-FFF2-40B4-BE49-F238E27FC236}">
-                  <a16:creationId xmlns:a16="http://schemas.microsoft.com/office/drawing/2014/main" id="{41073FC1-5E97-9841-8910-A39BB07D47D9}"/>
+                  <a16:creationId xmlns:a16="http://schemas.microsoft.com/office/drawing/2014/main" xmlns="" id="{41073FC1-5E97-9841-8910-A39BB07D47D9}"/>
                 </a:ext>
               </a:extLst>
             </p:cNvPr>
@@ -7023,6 +7126,364 @@
     <p:extLst>
       <p:ext uri="{BB962C8B-B14F-4D97-AF65-F5344CB8AC3E}">
         <p14:creationId xmlns:p14="http://schemas.microsoft.com/office/powerpoint/2010/main" val="2868283233"/>
+      </p:ext>
+    </p:extLst>
+  </p:cSld>
+  <p:clrMapOvr>
+    <a:masterClrMapping/>
+  </p:clrMapOvr>
+</p:sld>
+</file>
+
+<file path=ppt/slides/slide5.xml><?xml version="1.0" encoding="utf-8"?>
+<p:sld xmlns:a="http://schemas.openxmlformats.org/drawingml/2006/main" xmlns:r="http://schemas.openxmlformats.org/officeDocument/2006/relationships" xmlns:p="http://schemas.openxmlformats.org/presentationml/2006/main">
+  <p:cSld>
+    <p:spTree>
+      <p:nvGrpSpPr>
+        <p:cNvPr id="1" name=""/>
+        <p:cNvGrpSpPr/>
+        <p:nvPr/>
+      </p:nvGrpSpPr>
+      <p:grpSpPr>
+        <a:xfrm>
+          <a:off x="0" y="0"/>
+          <a:ext cx="0" cy="0"/>
+          <a:chOff x="0" y="0"/>
+          <a:chExt cx="0" cy="0"/>
+        </a:xfrm>
+      </p:grpSpPr>
+      <p:pic>
+        <p:nvPicPr>
+          <p:cNvPr id="18" name="그림 17">
+            <a:extLst>
+              <a:ext uri="{FF2B5EF4-FFF2-40B4-BE49-F238E27FC236}">
+                <a16:creationId xmlns:a16="http://schemas.microsoft.com/office/drawing/2014/main" xmlns="" id="{DFBD9B3E-8621-ED40-9D43-7585BA6E84F0}"/>
+              </a:ext>
+            </a:extLst>
+          </p:cNvPr>
+          <p:cNvPicPr>
+            <a:picLocks noChangeAspect="1"/>
+          </p:cNvPicPr>
+          <p:nvPr/>
+        </p:nvPicPr>
+        <p:blipFill>
+          <a:blip r:embed="rId2"/>
+          <a:stretch>
+            <a:fillRect/>
+          </a:stretch>
+        </p:blipFill>
+        <p:spPr>
+          <a:xfrm>
+            <a:off x="-1" y="-1"/>
+            <a:ext cx="24419311" cy="13716000"/>
+          </a:xfrm>
+          <a:prstGeom prst="rect">
+            <a:avLst/>
+          </a:prstGeom>
+        </p:spPr>
+      </p:pic>
+      <p:sp>
+        <p:nvSpPr>
+          <p:cNvPr id="9" name="TextBox 8">
+            <a:extLst>
+              <a:ext uri="{FF2B5EF4-FFF2-40B4-BE49-F238E27FC236}">
+                <a16:creationId xmlns:a16="http://schemas.microsoft.com/office/drawing/2014/main" xmlns="" id="{454B4978-6125-604F-AE03-58DD5D6D78C8}"/>
+              </a:ext>
+            </a:extLst>
+          </p:cNvPr>
+          <p:cNvSpPr txBox="1"/>
+          <p:nvPr/>
+        </p:nvSpPr>
+        <p:spPr>
+          <a:xfrm>
+            <a:off x="9000000" y="1800000"/>
+            <a:ext cx="14640585" cy="1846659"/>
+          </a:xfrm>
+          <a:prstGeom prst="rect">
+            <a:avLst/>
+          </a:prstGeom>
+          <a:noFill/>
+        </p:spPr>
+        <p:txBody>
+          <a:bodyPr wrap="square" lIns="0" tIns="0" rIns="0" bIns="0" rtlCol="0">
+            <a:spAutoFit/>
+          </a:bodyPr>
+          <a:lstStyle/>
+          <a:p>
+            <a:pPr>
+              <a:spcAft>
+                <a:spcPts val="500"/>
+              </a:spcAft>
+            </a:pPr>
+            <a:r>
+              <a:rPr kumimoji="1" lang="ko-KR" altLang="en-US" sz="12000" b="1" kern="1500" spc="-150" dirty="0">
+                <a:solidFill>
+                  <a:schemeClr val="bg1"/>
+                </a:solidFill>
+                <a:latin typeface="Noto Sans CJK KR Black" pitchFamily="34" charset="-127"/>
+                <a:ea typeface="Noto Sans CJK KR Black" pitchFamily="34" charset="-127"/>
+              </a:rPr>
+              <a:t>데이터 과학 언어 </a:t>
+            </a:r>
+            <a:r>
+              <a:rPr kumimoji="1" lang="ko-KR" altLang="en-US" sz="12000" b="1" kern="1500" spc="-150" dirty="0" smtClean="0">
+                <a:solidFill>
+                  <a:schemeClr val="bg1"/>
+                </a:solidFill>
+                <a:latin typeface="Noto Sans CJK KR Black" pitchFamily="34" charset="-127"/>
+                <a:ea typeface="Noto Sans CJK KR Black" pitchFamily="34" charset="-127"/>
+              </a:rPr>
+              <a:t>전쟁</a:t>
+            </a:r>
+            <a:endParaRPr kumimoji="1" lang="x-none" altLang="en-US" sz="12000" b="1" kern="1500" spc="-150" dirty="0">
+              <a:solidFill>
+                <a:schemeClr val="bg1"/>
+              </a:solidFill>
+              <a:latin typeface="Noto Sans CJK KR Black" pitchFamily="34" charset="-127"/>
+              <a:ea typeface="Noto Sans CJK KR Black" pitchFamily="34" charset="-127"/>
+            </a:endParaRPr>
+          </a:p>
+        </p:txBody>
+      </p:sp>
+      <p:sp>
+        <p:nvSpPr>
+          <p:cNvPr id="10" name="TextBox 9">
+            <a:extLst>
+              <a:ext uri="{FF2B5EF4-FFF2-40B4-BE49-F238E27FC236}">
+                <a16:creationId xmlns:a16="http://schemas.microsoft.com/office/drawing/2014/main" xmlns="" id="{C880A598-24D5-FE43-9658-485B6C4BB8A1}"/>
+              </a:ext>
+            </a:extLst>
+          </p:cNvPr>
+          <p:cNvSpPr txBox="1"/>
+          <p:nvPr/>
+        </p:nvSpPr>
+        <p:spPr>
+          <a:xfrm>
+            <a:off x="9000000" y="9000000"/>
+            <a:ext cx="14211692" cy="923330"/>
+          </a:xfrm>
+          <a:prstGeom prst="rect">
+            <a:avLst/>
+          </a:prstGeom>
+          <a:noFill/>
+        </p:spPr>
+        <p:txBody>
+          <a:bodyPr wrap="square" lIns="0" tIns="0" rIns="0" bIns="0" rtlCol="0">
+            <a:spAutoFit/>
+          </a:bodyPr>
+          <a:lstStyle/>
+          <a:p>
+            <a:pPr>
+              <a:spcAft>
+                <a:spcPts val="500"/>
+              </a:spcAft>
+            </a:pPr>
+            <a:r>
+              <a:rPr kumimoji="1" lang="ko-KR" altLang="en-US" sz="6000" b="1" kern="1500" spc="-150" dirty="0" smtClean="0">
+                <a:solidFill>
+                  <a:schemeClr val="bg1"/>
+                </a:solidFill>
+                <a:latin typeface="Noto Sans CJK KR Regular" pitchFamily="34" charset="-127"/>
+                <a:ea typeface="Noto Sans CJK KR Regular" pitchFamily="34" charset="-127"/>
+              </a:rPr>
+              <a:t>이광춘</a:t>
+            </a:r>
+            <a:r>
+              <a:rPr kumimoji="1" lang="en-US" altLang="ko-KR" sz="6000" b="1" kern="1500" spc="-150" dirty="0" smtClean="0">
+                <a:solidFill>
+                  <a:schemeClr val="bg1"/>
+                </a:solidFill>
+                <a:latin typeface="Noto Sans CJK KR Regular" pitchFamily="34" charset="-127"/>
+                <a:ea typeface="Noto Sans CJK KR Regular" pitchFamily="34" charset="-127"/>
+              </a:rPr>
+              <a:t> </a:t>
+            </a:r>
+            <a:r>
+              <a:rPr kumimoji="1" lang="en-US" altLang="ko-KR" sz="6000" kern="1500" spc="-150" dirty="0" smtClean="0">
+                <a:solidFill>
+                  <a:schemeClr val="bg1"/>
+                </a:solidFill>
+                <a:latin typeface="Noto Sans CJK KR Regular" pitchFamily="34" charset="-127"/>
+                <a:ea typeface="Noto Sans CJK KR Regular" pitchFamily="34" charset="-127"/>
+              </a:rPr>
+              <a:t>/</a:t>
+            </a:r>
+            <a:r>
+              <a:rPr kumimoji="1" lang="ko-KR" altLang="en-US" sz="6000" kern="1500" spc="-150" dirty="0" smtClean="0">
+                <a:solidFill>
+                  <a:schemeClr val="bg1"/>
+                </a:solidFill>
+                <a:latin typeface="Noto Sans CJK KR Regular" pitchFamily="34" charset="-127"/>
+                <a:ea typeface="Noto Sans CJK KR Regular" pitchFamily="34" charset="-127"/>
+              </a:rPr>
+              <a:t> </a:t>
+            </a:r>
+            <a:r>
+              <a:rPr kumimoji="1" lang="en-US" altLang="ko-KR" sz="6000" kern="1500" spc="-150" dirty="0" err="1" smtClean="0">
+                <a:solidFill>
+                  <a:schemeClr val="bg1"/>
+                </a:solidFill>
+                <a:latin typeface="Noto Sans CJK KR Regular" pitchFamily="34" charset="-127"/>
+                <a:ea typeface="Noto Sans CJK KR Regular" pitchFamily="34" charset="-127"/>
+              </a:rPr>
+              <a:t>Tidyverse</a:t>
+            </a:r>
+            <a:r>
+              <a:rPr kumimoji="1" lang="en-US" altLang="ko-KR" sz="6000" kern="1500" spc="-150" dirty="0" smtClean="0">
+                <a:solidFill>
+                  <a:schemeClr val="bg1"/>
+                </a:solidFill>
+                <a:latin typeface="Noto Sans CJK KR Regular" pitchFamily="34" charset="-127"/>
+                <a:ea typeface="Noto Sans CJK KR Regular" pitchFamily="34" charset="-127"/>
+              </a:rPr>
+              <a:t> Korea</a:t>
+            </a:r>
+            <a:r>
+              <a:rPr kumimoji="1" lang="ko-KR" altLang="en-US" sz="6000" kern="1500" spc="-150" dirty="0" smtClean="0">
+                <a:solidFill>
+                  <a:schemeClr val="bg1"/>
+                </a:solidFill>
+                <a:latin typeface="Noto Sans CJK KR Regular" pitchFamily="34" charset="-127"/>
+                <a:ea typeface="Noto Sans CJK KR Regular" pitchFamily="34" charset="-127"/>
+              </a:rPr>
+              <a:t> </a:t>
+            </a:r>
+            <a:r>
+              <a:rPr kumimoji="1" lang="en-US" altLang="ko-KR" sz="6000" kern="1500" spc="-150" dirty="0" smtClean="0">
+                <a:solidFill>
+                  <a:schemeClr val="bg1"/>
+                </a:solidFill>
+                <a:latin typeface="Noto Sans CJK KR Regular" pitchFamily="34" charset="-127"/>
+                <a:ea typeface="Noto Sans CJK KR Regular" pitchFamily="34" charset="-127"/>
+              </a:rPr>
+              <a:t>(</a:t>
+            </a:r>
+            <a:r>
+              <a:rPr kumimoji="1" lang="ko-KR" altLang="en-US" sz="6000" kern="1500" spc="-150" dirty="0" smtClean="0">
+                <a:solidFill>
+                  <a:schemeClr val="bg1"/>
+                </a:solidFill>
+                <a:latin typeface="Noto Sans CJK KR Regular" pitchFamily="34" charset="-127"/>
+                <a:ea typeface="Noto Sans CJK KR Regular" pitchFamily="34" charset="-127"/>
+              </a:rPr>
+              <a:t>데이터과학자</a:t>
+            </a:r>
+            <a:r>
+              <a:rPr kumimoji="1" lang="en-US" altLang="ko-KR" sz="6000" kern="1500" spc="-150" dirty="0" smtClean="0">
+                <a:solidFill>
+                  <a:schemeClr val="bg1"/>
+                </a:solidFill>
+                <a:latin typeface="Noto Sans CJK KR Regular" pitchFamily="34" charset="-127"/>
+                <a:ea typeface="Noto Sans CJK KR Regular" pitchFamily="34" charset="-127"/>
+              </a:rPr>
+              <a:t>)</a:t>
+            </a:r>
+            <a:endParaRPr kumimoji="1" lang="x-none" altLang="en-US" sz="6000" kern="1500" spc="-150" dirty="0">
+              <a:solidFill>
+                <a:schemeClr val="bg1"/>
+              </a:solidFill>
+              <a:latin typeface="Noto Sans CJK KR Regular" pitchFamily="34" charset="-127"/>
+              <a:ea typeface="Noto Sans CJK KR Regular" pitchFamily="34" charset="-127"/>
+            </a:endParaRPr>
+          </a:p>
+        </p:txBody>
+      </p:sp>
+      <p:cxnSp>
+        <p:nvCxnSpPr>
+          <p:cNvPr id="19" name="직선 연결선[R] 18">
+            <a:extLst>
+              <a:ext uri="{FF2B5EF4-FFF2-40B4-BE49-F238E27FC236}">
+                <a16:creationId xmlns:a16="http://schemas.microsoft.com/office/drawing/2014/main" xmlns="" id="{F19AFDA4-04D7-5E48-B89E-694C3C2AD633}"/>
+              </a:ext>
+            </a:extLst>
+          </p:cNvPr>
+          <p:cNvCxnSpPr/>
+          <p:nvPr/>
+        </p:nvCxnSpPr>
+        <p:spPr>
+          <a:xfrm>
+            <a:off x="9025400" y="8208000"/>
+            <a:ext cx="3191206" cy="0"/>
+          </a:xfrm>
+          <a:prstGeom prst="line">
+            <a:avLst/>
+          </a:prstGeom>
+          <a:ln w="38100">
+            <a:solidFill>
+              <a:srgbClr val="FEBE5E"/>
+            </a:solidFill>
+          </a:ln>
+        </p:spPr>
+        <p:style>
+          <a:lnRef idx="1">
+            <a:schemeClr val="accent1"/>
+          </a:lnRef>
+          <a:fillRef idx="0">
+            <a:schemeClr val="accent1"/>
+          </a:fillRef>
+          <a:effectRef idx="0">
+            <a:schemeClr val="accent1"/>
+          </a:effectRef>
+          <a:fontRef idx="minor">
+            <a:schemeClr val="tx1"/>
+          </a:fontRef>
+        </p:style>
+      </p:cxnSp>
+      <p:sp>
+        <p:nvSpPr>
+          <p:cNvPr id="2" name="직사각형 1"/>
+          <p:cNvSpPr/>
+          <p:nvPr/>
+        </p:nvSpPr>
+        <p:spPr>
+          <a:xfrm>
+            <a:off x="9191801" y="4692134"/>
+            <a:ext cx="13760498" cy="923330"/>
+          </a:xfrm>
+          <a:prstGeom prst="rect">
+            <a:avLst/>
+          </a:prstGeom>
+        </p:spPr>
+        <p:txBody>
+          <a:bodyPr wrap="none">
+            <a:spAutoFit/>
+          </a:bodyPr>
+          <a:lstStyle/>
+          <a:p>
+            <a:r>
+              <a:rPr kumimoji="1" lang="ko-KR" altLang="en-US" sz="5400" b="1" kern="1500" spc="-150" dirty="0">
+                <a:solidFill>
+                  <a:schemeClr val="bg1"/>
+                </a:solidFill>
+                <a:latin typeface="Noto Sans CJK KR Black" pitchFamily="34" charset="-127"/>
+                <a:ea typeface="Noto Sans CJK KR Black" pitchFamily="34" charset="-127"/>
+              </a:rPr>
+              <a:t>재미 중의 재미는 아무래도 싸움 구경 재미가 최고</a:t>
+            </a:r>
+            <a:r>
+              <a:rPr kumimoji="1" lang="en-US" altLang="ko-KR" sz="5400" b="1" kern="1500" spc="-150" dirty="0">
+                <a:solidFill>
+                  <a:schemeClr val="bg1"/>
+                </a:solidFill>
+                <a:latin typeface="Noto Sans CJK KR Black" pitchFamily="34" charset="-127"/>
+                <a:ea typeface="Noto Sans CJK KR Black" pitchFamily="34" charset="-127"/>
+              </a:rPr>
+              <a:t>!</a:t>
+            </a:r>
+            <a:endParaRPr kumimoji="1" lang="ko-KR" altLang="en-US" sz="5400" b="1" kern="1500" spc="-150" dirty="0">
+              <a:solidFill>
+                <a:schemeClr val="bg1"/>
+              </a:solidFill>
+              <a:latin typeface="Noto Sans CJK KR Black" pitchFamily="34" charset="-127"/>
+              <a:ea typeface="Noto Sans CJK KR Black" pitchFamily="34" charset="-127"/>
+            </a:endParaRPr>
+          </a:p>
+        </p:txBody>
+      </p:sp>
+    </p:spTree>
+    <p:extLst>
+      <p:ext uri="{BB962C8B-B14F-4D97-AF65-F5344CB8AC3E}">
+        <p14:creationId xmlns:p14="http://schemas.microsoft.com/office/powerpoint/2010/main" val="2660027204"/>
       </p:ext>
     </p:extLst>
   </p:cSld>
@@ -7075,7 +7536,7 @@
     </a:clrScheme>
     <a:fontScheme name="Office 테마">
       <a:majorFont>
-        <a:latin typeface="Calibri Light" panose="020F0302020204030204"/>
+        <a:latin typeface="Calibri Light"/>
         <a:ea typeface=""/>
         <a:cs typeface=""/>
         <a:font script="Jpan" typeface="游ゴシック Light"/>
@@ -7110,7 +7571,7 @@
         <a:font script="Geor" typeface="Sylfaen"/>
       </a:majorFont>
       <a:minorFont>
-        <a:latin typeface="Calibri" panose="020F0502020204030204"/>
+        <a:latin typeface="Calibri"/>
         <a:ea typeface=""/>
         <a:cs typeface=""/>
         <a:font script="Jpan" typeface="游ゴシック"/>
@@ -7287,7 +7748,7 @@
   <a:extraClrSchemeLst/>
   <a:extLst>
     <a:ext uri="{05A4C25C-085E-4340-85A3-A5531E510DB2}">
-      <thm15:themeFamily xmlns:thm15="http://schemas.microsoft.com/office/thememl/2012/main" name="Office Theme" id="{62F939B6-93AF-4DB8-9C6B-D6C7DFDC589F}" vid="{4A3C46E8-61CC-4603-A589-7422A47A8E4A}"/>
+      <thm15:themeFamily xmlns:thm15="http://schemas.microsoft.com/office/thememl/2012/main" xmlns="" name="Office Theme" id="{62F939B6-93AF-4DB8-9C6B-D6C7DFDC589F}" vid="{4A3C46E8-61CC-4603-A589-7422A47A8E4A}"/>
     </a:ext>
   </a:extLst>
 </a:theme>
@@ -7336,7 +7797,7 @@
     </a:clrScheme>
     <a:fontScheme name="Office">
       <a:majorFont>
-        <a:latin typeface="Calibri Light" panose="020F0302020204030204"/>
+        <a:latin typeface="Calibri Light"/>
         <a:ea typeface=""/>
         <a:cs typeface=""/>
         <a:font script="Jpan" typeface="游ゴシック Light"/>
@@ -7388,7 +7849,7 @@
         <a:font script="Tfng" typeface="Ebrima"/>
       </a:majorFont>
       <a:minorFont>
-        <a:latin typeface="Calibri" panose="020F0502020204030204"/>
+        <a:latin typeface="Calibri"/>
         <a:ea typeface=""/>
         <a:cs typeface=""/>
         <a:font script="Jpan" typeface="游ゴシック"/>
@@ -7582,7 +8043,7 @@
   <a:extraClrSchemeLst/>
   <a:extLst>
     <a:ext uri="{05A4C25C-085E-4340-85A3-A5531E510DB2}">
-      <thm15:themeFamily xmlns:thm15="http://schemas.microsoft.com/office/thememl/2012/main" name="Office Theme" id="{62F939B6-93AF-4DB8-9C6B-D6C7DFDC589F}" vid="{4A3C46E8-61CC-4603-A589-7422A47A8E4A}"/>
+      <thm15:themeFamily xmlns:thm15="http://schemas.microsoft.com/office/thememl/2012/main" xmlns="" name="Office Theme" id="{62F939B6-93AF-4DB8-9C6B-D6C7DFDC589F}" vid="{4A3C46E8-61CC-4603-A589-7422A47A8E4A}"/>
     </a:ext>
   </a:extLst>
 </a:theme>

</xml_diff>